<commit_message>
Fix link to workshop-related script
</commit_message>
<xml_diff>
--- a/Workshops/Workshop6.pptx
+++ b/Workshops/Workshop6.pptx
@@ -4443,17 +4443,17 @@
           <a:bodyPr/>
           <a:lstStyle/>
           <a:p>
-            <a:pPr lvl="0" indent="0">
+            <a:pPr lvl="0" marL="1270000" indent="0">
               <a:buNone/>
             </a:pPr>
             <a:r>
-              <a:rPr>
+              <a:rPr sz="1800">
                 <a:latin typeface="Courier"/>
               </a:rPr>
               <a:t>temp &lt;-</a:t>
             </a:r>
             <a:r>
-              <a:rPr>
+              <a:rPr sz="1800">
                 <a:solidFill>
                   <a:srgbClr val="4070A0"/>
                 </a:solidFill>
@@ -4462,7 +4462,7 @@
               <a:t> </a:t>
             </a:r>
             <a:r>
-              <a:rPr>
+              <a:rPr sz="1800">
                 <a:solidFill>
                   <a:srgbClr val="40A070"/>
                 </a:solidFill>
@@ -4473,7 +4473,7 @@
             <a:br/>
             <a:br/>
             <a:r>
-              <a:rPr b="1">
+              <a:rPr sz="1800" b="1">
                 <a:solidFill>
                   <a:srgbClr val="007020"/>
                 </a:solidFill>
@@ -4482,13 +4482,13 @@
               <a:t>if</a:t>
             </a:r>
             <a:r>
-              <a:rPr>
+              <a:rPr sz="1800">
                 <a:latin typeface="Courier"/>
               </a:rPr>
               <a:t>(temp </a:t>
             </a:r>
             <a:r>
-              <a:rPr>
+              <a:rPr sz="1800">
                 <a:solidFill>
                   <a:srgbClr val="666666"/>
                 </a:solidFill>
@@ -4497,7 +4497,7 @@
               <a:t>&gt;=</a:t>
             </a:r>
             <a:r>
-              <a:rPr>
+              <a:rPr sz="1800">
                 <a:solidFill>
                   <a:srgbClr val="4070A0"/>
                 </a:solidFill>
@@ -4506,7 +4506,7 @@
               <a:t> </a:t>
             </a:r>
             <a:r>
-              <a:rPr>
+              <a:rPr sz="1800">
                 <a:solidFill>
                   <a:srgbClr val="40A070"/>
                 </a:solidFill>
@@ -4515,27 +4515,27 @@
               <a:t>25</a:t>
             </a:r>
             <a:r>
-              <a:rPr>
+              <a:rPr sz="1800">
                 <a:latin typeface="Courier"/>
               </a:rPr>
               <a:t>){</a:t>
             </a:r>
             <a:br/>
             <a:r>
-              <a:rPr>
+              <a:rPr sz="1800">
                 <a:latin typeface="Courier"/>
               </a:rPr>
               <a:t>  </a:t>
             </a:r>
             <a:br/>
             <a:r>
-              <a:rPr>
+              <a:rPr sz="1800">
                 <a:latin typeface="Courier"/>
               </a:rPr>
               <a:t>  </a:t>
             </a:r>
             <a:r>
-              <a:rPr b="1">
+              <a:rPr sz="1800" b="1">
                 <a:solidFill>
                   <a:srgbClr val="007020"/>
                 </a:solidFill>
@@ -4544,13 +4544,13 @@
               <a:t>print</a:t>
             </a:r>
             <a:r>
-              <a:rPr>
+              <a:rPr sz="1800">
                 <a:latin typeface="Courier"/>
               </a:rPr>
               <a:t>(</a:t>
             </a:r>
             <a:r>
-              <a:rPr>
+              <a:rPr sz="1800">
                 <a:solidFill>
                   <a:srgbClr val="4070A0"/>
                 </a:solidFill>
@@ -4559,32 +4559,32 @@
               <a:t>"Put on sunscreen"</a:t>
             </a:r>
             <a:r>
-              <a:rPr>
+              <a:rPr sz="1800">
                 <a:latin typeface="Courier"/>
               </a:rPr>
               <a:t>)</a:t>
             </a:r>
             <a:br/>
             <a:r>
-              <a:rPr>
+              <a:rPr sz="1800">
                 <a:latin typeface="Courier"/>
               </a:rPr>
               <a:t>  </a:t>
             </a:r>
             <a:br/>
             <a:r>
-              <a:rPr>
+              <a:rPr sz="1800">
                 <a:latin typeface="Courier"/>
               </a:rPr>
               <a:t>}</a:t>
             </a:r>
           </a:p>
           <a:p>
-            <a:pPr lvl="0" indent="0">
+            <a:pPr lvl="0" marL="1270000" indent="0">
               <a:buNone/>
             </a:pPr>
             <a:r>
-              <a:rPr>
+              <a:rPr sz="1800">
                 <a:latin typeface="Courier"/>
               </a:rPr>
               <a:t>## [1] "Put on sunscreen"</a:t>
@@ -4756,17 +4756,17 @@
           <a:bodyPr/>
           <a:lstStyle/>
           <a:p>
-            <a:pPr lvl="0" indent="0">
+            <a:pPr lvl="0" marL="1270000" indent="0">
               <a:buNone/>
             </a:pPr>
             <a:r>
-              <a:rPr>
+              <a:rPr sz="1800">
                 <a:latin typeface="Courier"/>
               </a:rPr>
               <a:t>username &lt;-</a:t>
             </a:r>
             <a:r>
-              <a:rPr>
+              <a:rPr sz="1800">
                 <a:solidFill>
                   <a:srgbClr val="4070A0"/>
                 </a:solidFill>
@@ -4777,7 +4777,7 @@
             <a:br/>
             <a:br/>
             <a:r>
-              <a:rPr b="1">
+              <a:rPr sz="1800" b="1">
                 <a:solidFill>
                   <a:srgbClr val="007020"/>
                 </a:solidFill>
@@ -4786,13 +4786,13 @@
               <a:t>if</a:t>
             </a:r>
             <a:r>
-              <a:rPr>
+              <a:rPr sz="1800">
                 <a:latin typeface="Courier"/>
               </a:rPr>
               <a:t>(username </a:t>
             </a:r>
             <a:r>
-              <a:rPr>
+              <a:rPr sz="1800">
                 <a:solidFill>
                   <a:srgbClr val="666666"/>
                 </a:solidFill>
@@ -4801,7 +4801,7 @@
               <a:t>==</a:t>
             </a:r>
             <a:r>
-              <a:rPr>
+              <a:rPr sz="1800">
                 <a:solidFill>
                   <a:srgbClr val="4070A0"/>
                 </a:solidFill>
@@ -4810,27 +4810,27 @@
               <a:t> "the1andonly"</a:t>
             </a:r>
             <a:r>
-              <a:rPr>
+              <a:rPr sz="1800">
                 <a:latin typeface="Courier"/>
               </a:rPr>
               <a:t>){</a:t>
             </a:r>
             <a:br/>
             <a:r>
-              <a:rPr>
+              <a:rPr sz="1800">
                 <a:latin typeface="Courier"/>
               </a:rPr>
               <a:t>  </a:t>
             </a:r>
             <a:br/>
             <a:r>
-              <a:rPr>
+              <a:rPr sz="1800">
                 <a:latin typeface="Courier"/>
               </a:rPr>
               <a:t>  </a:t>
             </a:r>
             <a:r>
-              <a:rPr b="1">
+              <a:rPr sz="1800" b="1">
                 <a:solidFill>
                   <a:srgbClr val="007020"/>
                 </a:solidFill>
@@ -4839,13 +4839,13 @@
               <a:t>print</a:t>
             </a:r>
             <a:r>
-              <a:rPr>
+              <a:rPr sz="1800">
                 <a:latin typeface="Courier"/>
               </a:rPr>
               <a:t>(</a:t>
             </a:r>
             <a:r>
-              <a:rPr>
+              <a:rPr sz="1800">
                 <a:solidFill>
                   <a:srgbClr val="4070A0"/>
                 </a:solidFill>
@@ -4854,27 +4854,27 @@
               <a:t>"Welcome!"</a:t>
             </a:r>
             <a:r>
-              <a:rPr>
+              <a:rPr sz="1800">
                 <a:latin typeface="Courier"/>
               </a:rPr>
               <a:t>)</a:t>
             </a:r>
             <a:br/>
             <a:r>
-              <a:rPr>
+              <a:rPr sz="1800">
                 <a:latin typeface="Courier"/>
               </a:rPr>
               <a:t>  </a:t>
             </a:r>
             <a:br/>
             <a:r>
-              <a:rPr>
+              <a:rPr sz="1800">
                 <a:latin typeface="Courier"/>
               </a:rPr>
               <a:t>}</a:t>
             </a:r>
             <a:r>
-              <a:rPr b="1">
+              <a:rPr sz="1800" b="1">
                 <a:solidFill>
                   <a:srgbClr val="007020"/>
                 </a:solidFill>
@@ -4883,27 +4883,27 @@
               <a:t>else</a:t>
             </a:r>
             <a:r>
-              <a:rPr>
+              <a:rPr sz="1800">
                 <a:latin typeface="Courier"/>
               </a:rPr>
               <a:t>{</a:t>
             </a:r>
             <a:br/>
             <a:r>
-              <a:rPr>
+              <a:rPr sz="1800">
                 <a:latin typeface="Courier"/>
               </a:rPr>
               <a:t>  </a:t>
             </a:r>
             <a:br/>
             <a:r>
-              <a:rPr>
+              <a:rPr sz="1800">
                 <a:latin typeface="Courier"/>
               </a:rPr>
               <a:t>  </a:t>
             </a:r>
             <a:r>
-              <a:rPr b="1">
+              <a:rPr sz="1800" b="1">
                 <a:solidFill>
                   <a:srgbClr val="007020"/>
                 </a:solidFill>
@@ -4912,13 +4912,13 @@
               <a:t>print</a:t>
             </a:r>
             <a:r>
-              <a:rPr>
+              <a:rPr sz="1800">
                 <a:latin typeface="Courier"/>
               </a:rPr>
               <a:t>(</a:t>
             </a:r>
             <a:r>
-              <a:rPr b="1">
+              <a:rPr sz="1800" b="1">
                 <a:solidFill>
                   <a:srgbClr val="007020"/>
                 </a:solidFill>
@@ -4927,13 +4927,13 @@
               <a:t>paste</a:t>
             </a:r>
             <a:r>
-              <a:rPr>
+              <a:rPr sz="1800">
                 <a:latin typeface="Courier"/>
               </a:rPr>
               <a:t>(</a:t>
             </a:r>
             <a:r>
-              <a:rPr>
+              <a:rPr sz="1800">
                 <a:solidFill>
                   <a:srgbClr val="4070A0"/>
                 </a:solidFill>
@@ -4942,32 +4942,32 @@
               <a:t>"Intruder alert! Move away from the machine"</a:t>
             </a:r>
             <a:r>
-              <a:rPr>
+              <a:rPr sz="1800">
                 <a:latin typeface="Courier"/>
               </a:rPr>
               <a:t>, username))</a:t>
             </a:r>
             <a:br/>
             <a:r>
-              <a:rPr>
+              <a:rPr sz="1800">
                 <a:latin typeface="Courier"/>
               </a:rPr>
               <a:t>  </a:t>
             </a:r>
             <a:br/>
             <a:r>
-              <a:rPr>
+              <a:rPr sz="1800">
                 <a:latin typeface="Courier"/>
               </a:rPr>
               <a:t>}</a:t>
             </a:r>
           </a:p>
           <a:p>
-            <a:pPr lvl="0" indent="0">
+            <a:pPr lvl="0" marL="1270000" indent="0">
               <a:buNone/>
             </a:pPr>
             <a:r>
-              <a:rPr>
+              <a:rPr sz="1800">
                 <a:latin typeface="Courier"/>
               </a:rPr>
               <a:t>## [1] "Welcome!"</a:t>
@@ -5070,7 +5070,7 @@
               <a:t>Try filling in the practice to compute the correct summary statistic (</a:t>
             </a:r>
             <a:r>
-              <a:rPr>
+              <a:rPr sz="1800">
                 <a:latin typeface="Courier"/>
               </a:rPr>
               <a:t>mean</a:t>
@@ -5080,7 +5080,7 @@
               <a:t> or </a:t>
             </a:r>
             <a:r>
-              <a:rPr>
+              <a:rPr sz="1800">
                 <a:latin typeface="Courier"/>
               </a:rPr>
               <a:t>median</a:t>
@@ -5090,7 +5090,7 @@
               <a:t>) on the variable </a:t>
             </a:r>
             <a:r>
-              <a:rPr>
+              <a:rPr sz="1800">
                 <a:latin typeface="Courier"/>
               </a:rPr>
               <a:t>cchic$urea</a:t>
@@ -5100,7 +5100,7 @@
               <a:t>. Use </a:t>
             </a:r>
             <a:r>
-              <a:rPr>
+              <a:rPr sz="1800">
                 <a:latin typeface="Courier"/>
               </a:rPr>
               <a:t>print</a:t>
@@ -5194,17 +5194,17 @@
           <a:bodyPr/>
           <a:lstStyle/>
           <a:p>
-            <a:pPr lvl="0" indent="0">
+            <a:pPr lvl="0" marL="1270000" indent="0">
               <a:buNone/>
             </a:pPr>
             <a:r>
-              <a:rPr>
+              <a:rPr sz="1800">
                 <a:latin typeface="Courier"/>
               </a:rPr>
               <a:t>username &lt;-</a:t>
             </a:r>
             <a:r>
-              <a:rPr>
+              <a:rPr sz="1800">
                 <a:solidFill>
                   <a:srgbClr val="4070A0"/>
                 </a:solidFill>
@@ -5215,7 +5215,7 @@
             <a:br/>
             <a:br/>
             <a:r>
-              <a:rPr b="1">
+              <a:rPr sz="1800" b="1">
                 <a:solidFill>
                   <a:srgbClr val="007020"/>
                 </a:solidFill>
@@ -5224,13 +5224,13 @@
               <a:t>if</a:t>
             </a:r>
             <a:r>
-              <a:rPr>
+              <a:rPr sz="1800">
                 <a:latin typeface="Courier"/>
               </a:rPr>
               <a:t>(username </a:t>
             </a:r>
             <a:r>
-              <a:rPr>
+              <a:rPr sz="1800">
                 <a:solidFill>
                   <a:srgbClr val="666666"/>
                 </a:solidFill>
@@ -5239,7 +5239,7 @@
               <a:t>==</a:t>
             </a:r>
             <a:r>
-              <a:rPr>
+              <a:rPr sz="1800">
                 <a:solidFill>
                   <a:srgbClr val="4070A0"/>
                 </a:solidFill>
@@ -5248,27 +5248,27 @@
               <a:t> "the1andonly"</a:t>
             </a:r>
             <a:r>
-              <a:rPr>
+              <a:rPr sz="1800">
                 <a:latin typeface="Courier"/>
               </a:rPr>
               <a:t>){</a:t>
             </a:r>
             <a:br/>
             <a:r>
-              <a:rPr>
+              <a:rPr sz="1800">
                 <a:latin typeface="Courier"/>
               </a:rPr>
               <a:t>  </a:t>
             </a:r>
             <a:br/>
             <a:r>
-              <a:rPr>
+              <a:rPr sz="1800">
                 <a:latin typeface="Courier"/>
               </a:rPr>
               <a:t>  </a:t>
             </a:r>
             <a:r>
-              <a:rPr b="1">
+              <a:rPr sz="1800" b="1">
                 <a:solidFill>
                   <a:srgbClr val="007020"/>
                 </a:solidFill>
@@ -5277,13 +5277,13 @@
               <a:t>print</a:t>
             </a:r>
             <a:r>
-              <a:rPr>
+              <a:rPr sz="1800">
                 <a:latin typeface="Courier"/>
               </a:rPr>
               <a:t>(</a:t>
             </a:r>
             <a:r>
-              <a:rPr>
+              <a:rPr sz="1800">
                 <a:solidFill>
                   <a:srgbClr val="4070A0"/>
                 </a:solidFill>
@@ -5292,27 +5292,27 @@
               <a:t>"Welcome!"</a:t>
             </a:r>
             <a:r>
-              <a:rPr>
+              <a:rPr sz="1800">
                 <a:latin typeface="Courier"/>
               </a:rPr>
               <a:t>)</a:t>
             </a:r>
             <a:br/>
             <a:r>
-              <a:rPr>
+              <a:rPr sz="1800">
                 <a:latin typeface="Courier"/>
               </a:rPr>
               <a:t>  </a:t>
             </a:r>
             <a:br/>
             <a:r>
-              <a:rPr>
+              <a:rPr sz="1800">
                 <a:latin typeface="Courier"/>
               </a:rPr>
               <a:t>}</a:t>
             </a:r>
             <a:r>
-              <a:rPr b="1">
+              <a:rPr sz="1800" b="1">
                 <a:solidFill>
                   <a:srgbClr val="007020"/>
                 </a:solidFill>
@@ -5321,27 +5321,27 @@
               <a:t>else</a:t>
             </a:r>
             <a:r>
-              <a:rPr>
+              <a:rPr sz="1800">
                 <a:latin typeface="Courier"/>
               </a:rPr>
               <a:t>{</a:t>
             </a:r>
             <a:br/>
             <a:r>
-              <a:rPr>
+              <a:rPr sz="1800">
                 <a:latin typeface="Courier"/>
               </a:rPr>
               <a:t>  </a:t>
             </a:r>
             <a:br/>
             <a:r>
-              <a:rPr>
+              <a:rPr sz="1800">
                 <a:latin typeface="Courier"/>
               </a:rPr>
               <a:t>  </a:t>
             </a:r>
             <a:r>
-              <a:rPr b="1">
+              <a:rPr sz="1800" b="1">
                 <a:solidFill>
                   <a:srgbClr val="007020"/>
                 </a:solidFill>
@@ -5350,13 +5350,13 @@
               <a:t>print</a:t>
             </a:r>
             <a:r>
-              <a:rPr>
+              <a:rPr sz="1800">
                 <a:latin typeface="Courier"/>
               </a:rPr>
               <a:t>(</a:t>
             </a:r>
             <a:r>
-              <a:rPr b="1">
+              <a:rPr sz="1800" b="1">
                 <a:solidFill>
                   <a:srgbClr val="007020"/>
                 </a:solidFill>
@@ -5365,13 +5365,13 @@
               <a:t>paste</a:t>
             </a:r>
             <a:r>
-              <a:rPr>
+              <a:rPr sz="1800">
                 <a:latin typeface="Courier"/>
               </a:rPr>
               <a:t>(</a:t>
             </a:r>
             <a:r>
-              <a:rPr>
+              <a:rPr sz="1800">
                 <a:solidFill>
                   <a:srgbClr val="4070A0"/>
                 </a:solidFill>
@@ -5380,32 +5380,32 @@
               <a:t>"Intruder alert! Move away from the machine"</a:t>
             </a:r>
             <a:r>
-              <a:rPr>
+              <a:rPr sz="1800">
                 <a:latin typeface="Courier"/>
               </a:rPr>
               <a:t>, username))</a:t>
             </a:r>
             <a:br/>
             <a:r>
-              <a:rPr>
+              <a:rPr sz="1800">
                 <a:latin typeface="Courier"/>
               </a:rPr>
               <a:t>  </a:t>
             </a:r>
             <a:br/>
             <a:r>
-              <a:rPr>
+              <a:rPr sz="1800">
                 <a:latin typeface="Courier"/>
               </a:rPr>
               <a:t>}</a:t>
             </a:r>
           </a:p>
           <a:p>
-            <a:pPr lvl="0" indent="0">
+            <a:pPr lvl="0" marL="1270000" indent="0">
               <a:buNone/>
             </a:pPr>
             <a:r>
-              <a:rPr>
+              <a:rPr sz="1800">
                 <a:latin typeface="Courier"/>
               </a:rPr>
               <a:t>## [1] "Intruder alert! Move away from the machine David"</a:t>
@@ -5495,11 +5495,11 @@
           <a:bodyPr/>
           <a:lstStyle/>
           <a:p>
-            <a:pPr lvl="0" indent="0">
+            <a:pPr lvl="0" marL="1270000" indent="0">
               <a:buNone/>
             </a:pPr>
             <a:r>
-              <a:rPr b="1">
+              <a:rPr sz="1800" b="1">
                 <a:solidFill>
                   <a:srgbClr val="007020"/>
                 </a:solidFill>
@@ -5508,13 +5508,13 @@
               <a:t>ggplot</a:t>
             </a:r>
             <a:r>
-              <a:rPr>
+              <a:rPr sz="1800">
                 <a:latin typeface="Courier"/>
               </a:rPr>
               <a:t>(</a:t>
             </a:r>
             <a:r>
-              <a:rPr>
+              <a:rPr sz="1800">
                 <a:solidFill>
                   <a:srgbClr val="902000"/>
                 </a:solidFill>
@@ -5523,13 +5523,13 @@
               <a:t>data =</a:t>
             </a:r>
             <a:r>
-              <a:rPr>
+              <a:rPr sz="1800">
                 <a:latin typeface="Courier"/>
               </a:rPr>
               <a:t> cchic) </a:t>
             </a:r>
             <a:r>
-              <a:rPr>
+              <a:rPr sz="1800">
                 <a:solidFill>
                   <a:srgbClr val="666666"/>
                 </a:solidFill>
@@ -5538,7 +5538,7 @@
               <a:t>+</a:t>
             </a:r>
             <a:r>
-              <a:rPr>
+              <a:rPr sz="1800">
                 <a:solidFill>
                   <a:srgbClr val="4070A0"/>
                 </a:solidFill>
@@ -5548,7 +5548,7 @@
             </a:r>
             <a:br/>
             <a:r>
-              <a:rPr>
+              <a:rPr sz="1800">
                 <a:solidFill>
                   <a:srgbClr val="4070A0"/>
                 </a:solidFill>
@@ -5557,7 +5557,7 @@
               <a:t>  </a:t>
             </a:r>
             <a:r>
-              <a:rPr b="1">
+              <a:rPr sz="1800" b="1">
                 <a:solidFill>
                   <a:srgbClr val="007020"/>
                 </a:solidFill>
@@ -5566,13 +5566,13 @@
               <a:t>geom_histogram</a:t>
             </a:r>
             <a:r>
-              <a:rPr>
+              <a:rPr sz="1800">
                 <a:latin typeface="Courier"/>
               </a:rPr>
               <a:t>(</a:t>
             </a:r>
             <a:r>
-              <a:rPr b="1">
+              <a:rPr sz="1800" b="1">
                 <a:solidFill>
                   <a:srgbClr val="007020"/>
                 </a:solidFill>
@@ -5581,13 +5581,13 @@
               <a:t>aes</a:t>
             </a:r>
             <a:r>
-              <a:rPr>
+              <a:rPr sz="1800">
                 <a:latin typeface="Courier"/>
               </a:rPr>
               <a:t>(</a:t>
             </a:r>
             <a:r>
-              <a:rPr>
+              <a:rPr sz="1800">
                 <a:solidFill>
                   <a:srgbClr val="902000"/>
                 </a:solidFill>
@@ -5596,13 +5596,13 @@
               <a:t>x =</a:t>
             </a:r>
             <a:r>
-              <a:rPr>
+              <a:rPr sz="1800">
                 <a:latin typeface="Courier"/>
               </a:rPr>
               <a:t> urea), </a:t>
             </a:r>
             <a:r>
-              <a:rPr>
+              <a:rPr sz="1800">
                 <a:solidFill>
                   <a:srgbClr val="902000"/>
                 </a:solidFill>
@@ -5611,13 +5611,13 @@
               <a:t>bins =</a:t>
             </a:r>
             <a:r>
-              <a:rPr>
-                <a:latin typeface="Courier"/>
-              </a:rPr>
-              <a:t> </a:t>
-            </a:r>
-            <a:r>
-              <a:rPr>
+              <a:rPr sz="1800">
+                <a:latin typeface="Courier"/>
+              </a:rPr>
+              <a:t> </a:t>
+            </a:r>
+            <a:r>
+              <a:rPr sz="1800">
                 <a:solidFill>
                   <a:srgbClr val="40A070"/>
                 </a:solidFill>
@@ -5626,18 +5626,18 @@
               <a:t>30</a:t>
             </a:r>
             <a:r>
-              <a:rPr>
+              <a:rPr sz="1800">
                 <a:latin typeface="Courier"/>
               </a:rPr>
               <a:t>)</a:t>
             </a:r>
           </a:p>
           <a:p>
-            <a:pPr lvl="0" indent="0">
+            <a:pPr lvl="0" marL="1270000" indent="0">
               <a:buNone/>
             </a:pPr>
             <a:r>
-              <a:rPr>
+              <a:rPr sz="1800">
                 <a:latin typeface="Courier"/>
               </a:rPr>
               <a:t>## Warning: Removed 542 rows containing non-finite values (stat_bin).</a:t>
@@ -5745,17 +5745,17 @@
             </a:pPr>
           </a:p>
           <a:p>
-            <a:pPr lvl="0" indent="0">
+            <a:pPr lvl="0" marL="1270000" indent="0">
               <a:buNone/>
             </a:pPr>
             <a:r>
-              <a:rPr>
+              <a:rPr sz="1800">
                 <a:latin typeface="Courier"/>
               </a:rPr>
               <a:t>normal &lt;-</a:t>
             </a:r>
             <a:r>
-              <a:rPr>
+              <a:rPr sz="1800">
                 <a:solidFill>
                   <a:srgbClr val="4070A0"/>
                 </a:solidFill>
@@ -5764,7 +5764,7 @@
               <a:t> </a:t>
             </a:r>
             <a:r>
-              <a:rPr>
+              <a:rPr sz="1800">
                 <a:solidFill>
                   <a:srgbClr val="007020"/>
                 </a:solidFill>
@@ -5775,7 +5775,7 @@
             <a:br/>
             <a:br/>
             <a:r>
-              <a:rPr b="1">
+              <a:rPr sz="1800" b="1">
                 <a:solidFill>
                   <a:srgbClr val="007020"/>
                 </a:solidFill>
@@ -5784,13 +5784,13 @@
               <a:t>if</a:t>
             </a:r>
             <a:r>
-              <a:rPr>
+              <a:rPr sz="1800">
                 <a:latin typeface="Courier"/>
               </a:rPr>
               <a:t>(normal </a:t>
             </a:r>
             <a:r>
-              <a:rPr>
+              <a:rPr sz="1800">
                 <a:solidFill>
                   <a:srgbClr val="666666"/>
                 </a:solidFill>
@@ -5799,7 +5799,7 @@
               <a:t>==</a:t>
             </a:r>
             <a:r>
-              <a:rPr>
+              <a:rPr sz="1800">
                 <a:solidFill>
                   <a:srgbClr val="4070A0"/>
                 </a:solidFill>
@@ -5808,7 +5808,7 @@
               <a:t> </a:t>
             </a:r>
             <a:r>
-              <a:rPr>
+              <a:rPr sz="1800">
                 <a:solidFill>
                   <a:srgbClr val="007020"/>
                 </a:solidFill>
@@ -5817,27 +5817,27 @@
               <a:t>TRUE</a:t>
             </a:r>
             <a:r>
-              <a:rPr>
+              <a:rPr sz="1800">
                 <a:latin typeface="Courier"/>
               </a:rPr>
               <a:t>){</a:t>
             </a:r>
             <a:br/>
             <a:r>
-              <a:rPr>
+              <a:rPr sz="1800">
                 <a:latin typeface="Courier"/>
               </a:rPr>
               <a:t>  </a:t>
             </a:r>
             <a:br/>
             <a:r>
-              <a:rPr>
+              <a:rPr sz="1800">
                 <a:latin typeface="Courier"/>
               </a:rPr>
               <a:t>  </a:t>
             </a:r>
             <a:r>
-              <a:rPr b="1">
+              <a:rPr sz="1800" b="1">
                 <a:solidFill>
                   <a:srgbClr val="007020"/>
                 </a:solidFill>
@@ -5846,13 +5846,13 @@
               <a:t>print</a:t>
             </a:r>
             <a:r>
-              <a:rPr>
+              <a:rPr sz="1800">
                 <a:latin typeface="Courier"/>
               </a:rPr>
               <a:t>(</a:t>
             </a:r>
             <a:r>
-              <a:rPr b="1">
+              <a:rPr sz="1800" b="1">
                 <a:solidFill>
                   <a:srgbClr val="007020"/>
                 </a:solidFill>
@@ -5861,13 +5861,13 @@
               <a:t>mean</a:t>
             </a:r>
             <a:r>
-              <a:rPr>
+              <a:rPr sz="1800">
                 <a:latin typeface="Courier"/>
               </a:rPr>
               <a:t>(cchic</a:t>
             </a:r>
             <a:r>
-              <a:rPr>
+              <a:rPr sz="1800">
                 <a:solidFill>
                   <a:srgbClr val="666666"/>
                 </a:solidFill>
@@ -5876,13 +5876,13 @@
               <a:t>$</a:t>
             </a:r>
             <a:r>
-              <a:rPr>
+              <a:rPr sz="1800">
                 <a:latin typeface="Courier"/>
               </a:rPr>
               <a:t>urea, </a:t>
             </a:r>
             <a:r>
-              <a:rPr>
+              <a:rPr sz="1800">
                 <a:solidFill>
                   <a:srgbClr val="902000"/>
                 </a:solidFill>
@@ -5891,27 +5891,27 @@
               <a:t>na.rm =</a:t>
             </a:r>
             <a:r>
-              <a:rPr>
+              <a:rPr sz="1800">
                 <a:latin typeface="Courier"/>
               </a:rPr>
               <a:t> T))</a:t>
             </a:r>
             <a:br/>
             <a:r>
-              <a:rPr>
+              <a:rPr sz="1800">
                 <a:latin typeface="Courier"/>
               </a:rPr>
               <a:t>  </a:t>
             </a:r>
             <a:br/>
             <a:r>
-              <a:rPr>
+              <a:rPr sz="1800">
                 <a:latin typeface="Courier"/>
               </a:rPr>
               <a:t>}</a:t>
             </a:r>
             <a:r>
-              <a:rPr b="1">
+              <a:rPr sz="1800" b="1">
                 <a:solidFill>
                   <a:srgbClr val="007020"/>
                 </a:solidFill>
@@ -5920,27 +5920,27 @@
               <a:t>else</a:t>
             </a:r>
             <a:r>
-              <a:rPr>
+              <a:rPr sz="1800">
                 <a:latin typeface="Courier"/>
               </a:rPr>
               <a:t>{</a:t>
             </a:r>
             <a:br/>
             <a:r>
-              <a:rPr>
+              <a:rPr sz="1800">
                 <a:latin typeface="Courier"/>
               </a:rPr>
               <a:t>  </a:t>
             </a:r>
             <a:br/>
             <a:r>
-              <a:rPr>
+              <a:rPr sz="1800">
                 <a:latin typeface="Courier"/>
               </a:rPr>
               <a:t>  </a:t>
             </a:r>
             <a:r>
-              <a:rPr b="1">
+              <a:rPr sz="1800" b="1">
                 <a:solidFill>
                   <a:srgbClr val="007020"/>
                 </a:solidFill>
@@ -5949,13 +5949,13 @@
               <a:t>print</a:t>
             </a:r>
             <a:r>
-              <a:rPr>
+              <a:rPr sz="1800">
                 <a:latin typeface="Courier"/>
               </a:rPr>
               <a:t>(</a:t>
             </a:r>
             <a:r>
-              <a:rPr b="1">
+              <a:rPr sz="1800" b="1">
                 <a:solidFill>
                   <a:srgbClr val="007020"/>
                 </a:solidFill>
@@ -5964,13 +5964,13 @@
               <a:t>median</a:t>
             </a:r>
             <a:r>
-              <a:rPr>
+              <a:rPr sz="1800">
                 <a:latin typeface="Courier"/>
               </a:rPr>
               <a:t>(cchic</a:t>
             </a:r>
             <a:r>
-              <a:rPr>
+              <a:rPr sz="1800">
                 <a:solidFill>
                   <a:srgbClr val="666666"/>
                 </a:solidFill>
@@ -5979,13 +5979,13 @@
               <a:t>$</a:t>
             </a:r>
             <a:r>
-              <a:rPr>
+              <a:rPr sz="1800">
                 <a:latin typeface="Courier"/>
               </a:rPr>
               <a:t>urea, </a:t>
             </a:r>
             <a:r>
-              <a:rPr>
+              <a:rPr sz="1800">
                 <a:solidFill>
                   <a:srgbClr val="902000"/>
                 </a:solidFill>
@@ -5994,32 +5994,32 @@
               <a:t>na.rm =</a:t>
             </a:r>
             <a:r>
-              <a:rPr>
+              <a:rPr sz="1800">
                 <a:latin typeface="Courier"/>
               </a:rPr>
               <a:t> T))</a:t>
             </a:r>
             <a:br/>
             <a:r>
-              <a:rPr>
+              <a:rPr sz="1800">
                 <a:latin typeface="Courier"/>
               </a:rPr>
               <a:t>  </a:t>
             </a:r>
             <a:br/>
             <a:r>
-              <a:rPr>
+              <a:rPr sz="1800">
                 <a:latin typeface="Courier"/>
               </a:rPr>
               <a:t>}</a:t>
             </a:r>
           </a:p>
           <a:p>
-            <a:pPr lvl="0" indent="0">
+            <a:pPr lvl="0" marL="1270000" indent="0">
               <a:buNone/>
             </a:pPr>
             <a:r>
-              <a:rPr>
+              <a:rPr sz="1800">
                 <a:latin typeface="Courier"/>
               </a:rPr>
               <a:t>## [1] 6.1</a:t>
@@ -6130,7 +6130,7 @@
               <a:t>Here, we can string together multiple (as many as you like) </a:t>
             </a:r>
             <a:r>
-              <a:rPr>
+              <a:rPr sz="1800">
                 <a:latin typeface="Courier"/>
               </a:rPr>
               <a:t>else if</a:t>
@@ -6224,17 +6224,17 @@
           <a:bodyPr/>
           <a:lstStyle/>
           <a:p>
-            <a:pPr lvl="0" indent="0">
+            <a:pPr lvl="0" marL="1270000" indent="0">
               <a:buNone/>
             </a:pPr>
             <a:r>
-              <a:rPr>
+              <a:rPr sz="1800">
                 <a:latin typeface="Courier"/>
               </a:rPr>
               <a:t>mean_urea &lt;-</a:t>
             </a:r>
             <a:r>
-              <a:rPr>
+              <a:rPr sz="1800">
                 <a:solidFill>
                   <a:srgbClr val="4070A0"/>
                 </a:solidFill>
@@ -6243,7 +6243,7 @@
               <a:t> </a:t>
             </a:r>
             <a:r>
-              <a:rPr b="1">
+              <a:rPr sz="1800" b="1">
                 <a:solidFill>
                   <a:srgbClr val="007020"/>
                 </a:solidFill>
@@ -6252,13 +6252,13 @@
               <a:t>mean</a:t>
             </a:r>
             <a:r>
-              <a:rPr>
+              <a:rPr sz="1800">
                 <a:latin typeface="Courier"/>
               </a:rPr>
               <a:t>(cchic</a:t>
             </a:r>
             <a:r>
-              <a:rPr>
+              <a:rPr sz="1800">
                 <a:solidFill>
                   <a:srgbClr val="666666"/>
                 </a:solidFill>
@@ -6267,13 +6267,13 @@
               <a:t>$</a:t>
             </a:r>
             <a:r>
-              <a:rPr>
+              <a:rPr sz="1800">
                 <a:latin typeface="Courier"/>
               </a:rPr>
               <a:t>urea, </a:t>
             </a:r>
             <a:r>
-              <a:rPr>
+              <a:rPr sz="1800">
                 <a:solidFill>
                   <a:srgbClr val="902000"/>
                 </a:solidFill>
@@ -6282,20 +6282,20 @@
               <a:t>na.rm =</a:t>
             </a:r>
             <a:r>
-              <a:rPr>
+              <a:rPr sz="1800">
                 <a:latin typeface="Courier"/>
               </a:rPr>
               <a:t> T)</a:t>
             </a:r>
             <a:br/>
             <a:r>
-              <a:rPr>
+              <a:rPr sz="1800">
                 <a:latin typeface="Courier"/>
               </a:rPr>
               <a:t>median_urea &lt;-</a:t>
             </a:r>
             <a:r>
-              <a:rPr>
+              <a:rPr sz="1800">
                 <a:solidFill>
                   <a:srgbClr val="4070A0"/>
                 </a:solidFill>
@@ -6304,7 +6304,7 @@
               <a:t> </a:t>
             </a:r>
             <a:r>
-              <a:rPr b="1">
+              <a:rPr sz="1800" b="1">
                 <a:solidFill>
                   <a:srgbClr val="007020"/>
                 </a:solidFill>
@@ -6313,13 +6313,13 @@
               <a:t>median</a:t>
             </a:r>
             <a:r>
-              <a:rPr>
+              <a:rPr sz="1800">
                 <a:latin typeface="Courier"/>
               </a:rPr>
               <a:t>(cchic</a:t>
             </a:r>
             <a:r>
-              <a:rPr>
+              <a:rPr sz="1800">
                 <a:solidFill>
                   <a:srgbClr val="666666"/>
                 </a:solidFill>
@@ -6328,13 +6328,13 @@
               <a:t>$</a:t>
             </a:r>
             <a:r>
-              <a:rPr>
+              <a:rPr sz="1800">
                 <a:latin typeface="Courier"/>
               </a:rPr>
               <a:t>urea, </a:t>
             </a:r>
             <a:r>
-              <a:rPr>
+              <a:rPr sz="1800">
                 <a:solidFill>
                   <a:srgbClr val="902000"/>
                 </a:solidFill>
@@ -6343,7 +6343,7 @@
               <a:t>na.rm =</a:t>
             </a:r>
             <a:r>
-              <a:rPr>
+              <a:rPr sz="1800">
                 <a:latin typeface="Courier"/>
               </a:rPr>
               <a:t> T)</a:t>
@@ -6351,7 +6351,7 @@
             <a:br/>
             <a:br/>
             <a:r>
-              <a:rPr b="1">
+              <a:rPr sz="1800" b="1">
                 <a:solidFill>
                   <a:srgbClr val="007020"/>
                 </a:solidFill>
@@ -6360,13 +6360,13 @@
               <a:t>if</a:t>
             </a:r>
             <a:r>
-              <a:rPr>
+              <a:rPr sz="1800">
                 <a:latin typeface="Courier"/>
               </a:rPr>
               <a:t>(median_urea </a:t>
             </a:r>
             <a:r>
-              <a:rPr>
+              <a:rPr sz="1800">
                 <a:solidFill>
                   <a:srgbClr val="666666"/>
                 </a:solidFill>
@@ -6375,7 +6375,7 @@
               <a:t>&lt;</a:t>
             </a:r>
             <a:r>
-              <a:rPr>
+              <a:rPr sz="1800">
                 <a:solidFill>
                   <a:srgbClr val="4070A0"/>
                 </a:solidFill>
@@ -6384,27 +6384,27 @@
               <a:t> </a:t>
             </a:r>
             <a:r>
-              <a:rPr>
+              <a:rPr sz="1800">
                 <a:latin typeface="Courier"/>
               </a:rPr>
               <a:t>mean_urea){</a:t>
             </a:r>
             <a:br/>
             <a:r>
-              <a:rPr>
+              <a:rPr sz="1800">
                 <a:latin typeface="Courier"/>
               </a:rPr>
               <a:t>  </a:t>
             </a:r>
             <a:br/>
             <a:r>
-              <a:rPr>
+              <a:rPr sz="1800">
                 <a:latin typeface="Courier"/>
               </a:rPr>
               <a:t>  </a:t>
             </a:r>
             <a:r>
-              <a:rPr b="1">
+              <a:rPr sz="1800" b="1">
                 <a:solidFill>
                   <a:srgbClr val="007020"/>
                 </a:solidFill>
@@ -6413,13 +6413,13 @@
               <a:t>print</a:t>
             </a:r>
             <a:r>
-              <a:rPr>
+              <a:rPr sz="1800">
                 <a:latin typeface="Courier"/>
               </a:rPr>
               <a:t>(</a:t>
             </a:r>
             <a:r>
-              <a:rPr>
+              <a:rPr sz="1800">
                 <a:solidFill>
                   <a:srgbClr val="4070A0"/>
                 </a:solidFill>
@@ -6428,27 +6428,27 @@
               <a:t>"Data is negatively skewed"</a:t>
             </a:r>
             <a:r>
-              <a:rPr>
+              <a:rPr sz="1800">
                 <a:latin typeface="Courier"/>
               </a:rPr>
               <a:t>)</a:t>
             </a:r>
             <a:br/>
             <a:r>
-              <a:rPr>
+              <a:rPr sz="1800">
                 <a:latin typeface="Courier"/>
               </a:rPr>
               <a:t>  </a:t>
             </a:r>
             <a:br/>
             <a:r>
-              <a:rPr>
+              <a:rPr sz="1800">
                 <a:latin typeface="Courier"/>
               </a:rPr>
               <a:t>}</a:t>
             </a:r>
             <a:r>
-              <a:rPr b="1">
+              <a:rPr sz="1800" b="1">
                 <a:solidFill>
                   <a:srgbClr val="007020"/>
                 </a:solidFill>
@@ -6457,13 +6457,13 @@
               <a:t>else</a:t>
             </a:r>
             <a:r>
-              <a:rPr>
-                <a:latin typeface="Courier"/>
-              </a:rPr>
-              <a:t> </a:t>
-            </a:r>
-            <a:r>
-              <a:rPr b="1">
+              <a:rPr sz="1800">
+                <a:latin typeface="Courier"/>
+              </a:rPr>
+              <a:t> </a:t>
+            </a:r>
+            <a:r>
+              <a:rPr sz="1800" b="1">
                 <a:solidFill>
                   <a:srgbClr val="007020"/>
                 </a:solidFill>
@@ -6472,13 +6472,13 @@
               <a:t>if</a:t>
             </a:r>
             <a:r>
-              <a:rPr>
+              <a:rPr sz="1800">
                 <a:latin typeface="Courier"/>
               </a:rPr>
               <a:t>(median_urea </a:t>
             </a:r>
             <a:r>
-              <a:rPr>
+              <a:rPr sz="1800">
                 <a:solidFill>
                   <a:srgbClr val="666666"/>
                 </a:solidFill>
@@ -6487,7 +6487,7 @@
               <a:t>&gt;</a:t>
             </a:r>
             <a:r>
-              <a:rPr>
+              <a:rPr sz="1800">
                 <a:solidFill>
                   <a:srgbClr val="4070A0"/>
                 </a:solidFill>
@@ -6496,7 +6496,7 @@
               <a:t> </a:t>
             </a:r>
             <a:r>
-              <a:rPr>
+              <a:rPr sz="1800">
                 <a:latin typeface="Courier"/>
               </a:rPr>
               <a:t>mean_urea){</a:t>
@@ -6504,13 +6504,13 @@
             <a:br/>
             <a:br/>
             <a:r>
-              <a:rPr>
+              <a:rPr sz="1800">
                 <a:latin typeface="Courier"/>
               </a:rPr>
               <a:t>  </a:t>
             </a:r>
             <a:r>
-              <a:rPr b="1">
+              <a:rPr sz="1800" b="1">
                 <a:solidFill>
                   <a:srgbClr val="007020"/>
                 </a:solidFill>
@@ -6519,13 +6519,13 @@
               <a:t>print</a:t>
             </a:r>
             <a:r>
-              <a:rPr>
+              <a:rPr sz="1800">
                 <a:latin typeface="Courier"/>
               </a:rPr>
               <a:t>(</a:t>
             </a:r>
             <a:r>
-              <a:rPr>
+              <a:rPr sz="1800">
                 <a:solidFill>
                   <a:srgbClr val="4070A0"/>
                 </a:solidFill>
@@ -6534,27 +6534,27 @@
               <a:t>"Data is positively skewed"</a:t>
             </a:r>
             <a:r>
-              <a:rPr>
+              <a:rPr sz="1800">
                 <a:latin typeface="Courier"/>
               </a:rPr>
               <a:t>)</a:t>
             </a:r>
             <a:br/>
             <a:r>
-              <a:rPr>
+              <a:rPr sz="1800">
                 <a:latin typeface="Courier"/>
               </a:rPr>
               <a:t>  </a:t>
             </a:r>
             <a:br/>
             <a:r>
-              <a:rPr>
+              <a:rPr sz="1800">
                 <a:latin typeface="Courier"/>
               </a:rPr>
               <a:t>}</a:t>
             </a:r>
             <a:r>
-              <a:rPr b="1">
+              <a:rPr sz="1800" b="1">
                 <a:solidFill>
                   <a:srgbClr val="007020"/>
                 </a:solidFill>
@@ -6563,27 +6563,27 @@
               <a:t>else</a:t>
             </a:r>
             <a:r>
-              <a:rPr>
+              <a:rPr sz="1800">
                 <a:latin typeface="Courier"/>
               </a:rPr>
               <a:t>{</a:t>
             </a:r>
             <a:br/>
             <a:r>
-              <a:rPr>
+              <a:rPr sz="1800">
                 <a:latin typeface="Courier"/>
               </a:rPr>
               <a:t>  </a:t>
             </a:r>
             <a:br/>
             <a:r>
-              <a:rPr>
+              <a:rPr sz="1800">
                 <a:latin typeface="Courier"/>
               </a:rPr>
               <a:t>  </a:t>
             </a:r>
             <a:r>
-              <a:rPr b="1">
+              <a:rPr sz="1800" b="1">
                 <a:solidFill>
                   <a:srgbClr val="007020"/>
                 </a:solidFill>
@@ -6592,13 +6592,13 @@
               <a:t>print</a:t>
             </a:r>
             <a:r>
-              <a:rPr>
+              <a:rPr sz="1800">
                 <a:latin typeface="Courier"/>
               </a:rPr>
               <a:t>(</a:t>
             </a:r>
             <a:r>
-              <a:rPr>
+              <a:rPr sz="1800">
                 <a:solidFill>
                   <a:srgbClr val="4070A0"/>
                 </a:solidFill>
@@ -6607,32 +6607,32 @@
               <a:t>"Data is normally distributed"</a:t>
             </a:r>
             <a:r>
-              <a:rPr>
+              <a:rPr sz="1800">
                 <a:latin typeface="Courier"/>
               </a:rPr>
               <a:t>)</a:t>
             </a:r>
             <a:br/>
             <a:r>
-              <a:rPr>
+              <a:rPr sz="1800">
                 <a:latin typeface="Courier"/>
               </a:rPr>
               <a:t>  </a:t>
             </a:r>
             <a:br/>
             <a:r>
-              <a:rPr>
+              <a:rPr sz="1800">
                 <a:latin typeface="Courier"/>
               </a:rPr>
               <a:t>}</a:t>
             </a:r>
           </a:p>
           <a:p>
-            <a:pPr lvl="0" indent="0">
+            <a:pPr lvl="0" marL="1270000" indent="0">
               <a:buNone/>
             </a:pPr>
             <a:r>
-              <a:rPr>
+              <a:rPr sz="1800">
                 <a:latin typeface="Courier"/>
               </a:rPr>
               <a:t>## [1] "Data is negatively skewed"</a:t>
@@ -7011,11 +7011,11 @@
           <a:bodyPr/>
           <a:lstStyle/>
           <a:p>
-            <a:pPr lvl="0" indent="0">
+            <a:pPr lvl="0" marL="1270000" indent="0">
               <a:buNone/>
             </a:pPr>
             <a:r>
-              <a:rPr b="1">
+              <a:rPr sz="1800" b="1">
                 <a:solidFill>
                   <a:srgbClr val="007020"/>
                 </a:solidFill>
@@ -7024,13 +7024,13 @@
               <a:t>for</a:t>
             </a:r>
             <a:r>
-              <a:rPr>
+              <a:rPr sz="1800">
                 <a:latin typeface="Courier"/>
               </a:rPr>
               <a:t>(i </a:t>
             </a:r>
             <a:r>
-              <a:rPr b="1">
+              <a:rPr sz="1800" b="1">
                 <a:solidFill>
                   <a:srgbClr val="007020"/>
                 </a:solidFill>
@@ -7039,13 +7039,13 @@
               <a:t>in</a:t>
             </a:r>
             <a:r>
-              <a:rPr>
-                <a:latin typeface="Courier"/>
-              </a:rPr>
-              <a:t> </a:t>
-            </a:r>
-            <a:r>
-              <a:rPr>
+              <a:rPr sz="1800">
+                <a:latin typeface="Courier"/>
+              </a:rPr>
+              <a:t> </a:t>
+            </a:r>
+            <a:r>
+              <a:rPr sz="1800">
                 <a:solidFill>
                   <a:srgbClr val="40A070"/>
                 </a:solidFill>
@@ -7054,7 +7054,7 @@
               <a:t>1</a:t>
             </a:r>
             <a:r>
-              <a:rPr>
+              <a:rPr sz="1800">
                 <a:solidFill>
                   <a:srgbClr val="666666"/>
                 </a:solidFill>
@@ -7063,7 +7063,7 @@
               <a:t>:</a:t>
             </a:r>
             <a:r>
-              <a:rPr>
+              <a:rPr sz="1800">
                 <a:solidFill>
                   <a:srgbClr val="40A070"/>
                 </a:solidFill>
@@ -7072,27 +7072,27 @@
               <a:t>5</a:t>
             </a:r>
             <a:r>
-              <a:rPr>
+              <a:rPr sz="1800">
                 <a:latin typeface="Courier"/>
               </a:rPr>
               <a:t>){</a:t>
             </a:r>
             <a:br/>
             <a:r>
-              <a:rPr>
+              <a:rPr sz="1800">
                 <a:latin typeface="Courier"/>
               </a:rPr>
               <a:t>  </a:t>
             </a:r>
             <a:br/>
             <a:r>
-              <a:rPr>
+              <a:rPr sz="1800">
                 <a:latin typeface="Courier"/>
               </a:rPr>
               <a:t>  </a:t>
             </a:r>
             <a:r>
-              <a:rPr b="1">
+              <a:rPr sz="1800" b="1">
                 <a:solidFill>
                   <a:srgbClr val="007020"/>
                 </a:solidFill>
@@ -7101,32 +7101,32 @@
               <a:t>print</a:t>
             </a:r>
             <a:r>
-              <a:rPr>
+              <a:rPr sz="1800">
                 <a:latin typeface="Courier"/>
               </a:rPr>
               <a:t>(i)</a:t>
             </a:r>
             <a:br/>
             <a:r>
-              <a:rPr>
+              <a:rPr sz="1800">
                 <a:latin typeface="Courier"/>
               </a:rPr>
               <a:t>  </a:t>
             </a:r>
             <a:br/>
             <a:r>
-              <a:rPr>
+              <a:rPr sz="1800">
                 <a:latin typeface="Courier"/>
               </a:rPr>
               <a:t>}</a:t>
             </a:r>
           </a:p>
           <a:p>
-            <a:pPr lvl="0" indent="0">
+            <a:pPr lvl="0" marL="1270000" indent="0">
               <a:buNone/>
             </a:pPr>
             <a:r>
-              <a:rPr>
+              <a:rPr sz="1800">
                 <a:latin typeface="Courier"/>
               </a:rPr>
               <a:t>## [1] 1
@@ -7236,17 +7236,17 @@
           <a:bodyPr/>
           <a:lstStyle/>
           <a:p>
-            <a:pPr lvl="0" indent="0">
+            <a:pPr lvl="0" marL="1270000" indent="0">
               <a:buNone/>
             </a:pPr>
             <a:r>
-              <a:rPr>
+              <a:rPr sz="1800">
                 <a:latin typeface="Courier"/>
               </a:rPr>
               <a:t>x &lt;-</a:t>
             </a:r>
             <a:r>
-              <a:rPr>
+              <a:rPr sz="1800">
                 <a:solidFill>
                   <a:srgbClr val="4070A0"/>
                 </a:solidFill>
@@ -7255,7 +7255,7 @@
               <a:t> </a:t>
             </a:r>
             <a:r>
-              <a:rPr b="1">
+              <a:rPr sz="1800" b="1">
                 <a:solidFill>
                   <a:srgbClr val="007020"/>
                 </a:solidFill>
@@ -7264,13 +7264,13 @@
               <a:t>c</a:t>
             </a:r>
             <a:r>
-              <a:rPr>
+              <a:rPr sz="1800">
                 <a:latin typeface="Courier"/>
               </a:rPr>
               <a:t>(</a:t>
             </a:r>
             <a:r>
-              <a:rPr>
+              <a:rPr sz="1800">
                 <a:solidFill>
                   <a:srgbClr val="4070A0"/>
                 </a:solidFill>
@@ -7279,13 +7279,13 @@
               <a:t>"the"</a:t>
             </a:r>
             <a:r>
-              <a:rPr>
+              <a:rPr sz="1800">
                 <a:latin typeface="Courier"/>
               </a:rPr>
               <a:t>, </a:t>
             </a:r>
             <a:r>
-              <a:rPr>
+              <a:rPr sz="1800">
                 <a:solidFill>
                   <a:srgbClr val="4070A0"/>
                 </a:solidFill>
@@ -7294,13 +7294,13 @@
               <a:t>"classic"</a:t>
             </a:r>
             <a:r>
-              <a:rPr>
+              <a:rPr sz="1800">
                 <a:latin typeface="Courier"/>
               </a:rPr>
               <a:t>, </a:t>
             </a:r>
             <a:r>
-              <a:rPr>
+              <a:rPr sz="1800">
                 <a:solidFill>
                   <a:srgbClr val="4070A0"/>
                 </a:solidFill>
@@ -7309,13 +7309,13 @@
               <a:t>"hello"</a:t>
             </a:r>
             <a:r>
-              <a:rPr>
+              <a:rPr sz="1800">
                 <a:latin typeface="Courier"/>
               </a:rPr>
               <a:t>, </a:t>
             </a:r>
             <a:r>
-              <a:rPr>
+              <a:rPr sz="1800">
                 <a:solidFill>
                   <a:srgbClr val="4070A0"/>
                 </a:solidFill>
@@ -7324,13 +7324,13 @@
               <a:t>"world"</a:t>
             </a:r>
             <a:r>
-              <a:rPr>
+              <a:rPr sz="1800">
                 <a:latin typeface="Courier"/>
               </a:rPr>
               <a:t>, </a:t>
             </a:r>
             <a:r>
-              <a:rPr>
+              <a:rPr sz="1800">
                 <a:solidFill>
                   <a:srgbClr val="4070A0"/>
                 </a:solidFill>
@@ -7339,14 +7339,14 @@
               <a:t>"example"</a:t>
             </a:r>
             <a:r>
-              <a:rPr>
+              <a:rPr sz="1800">
                 <a:latin typeface="Courier"/>
               </a:rPr>
               <a:t>)</a:t>
             </a:r>
             <a:br/>
             <a:r>
-              <a:rPr b="1">
+              <a:rPr sz="1800" b="1">
                 <a:solidFill>
                   <a:srgbClr val="007020"/>
                 </a:solidFill>
@@ -7355,13 +7355,13 @@
               <a:t>print</a:t>
             </a:r>
             <a:r>
-              <a:rPr>
+              <a:rPr sz="1800">
                 <a:latin typeface="Courier"/>
               </a:rPr>
               <a:t>(x[</a:t>
             </a:r>
             <a:r>
-              <a:rPr>
+              <a:rPr sz="1800">
                 <a:solidFill>
                   <a:srgbClr val="40A070"/>
                 </a:solidFill>
@@ -7370,29 +7370,29 @@
               <a:t>1</a:t>
             </a:r>
             <a:r>
-              <a:rPr>
+              <a:rPr sz="1800">
                 <a:latin typeface="Courier"/>
               </a:rPr>
               <a:t>])</a:t>
             </a:r>
           </a:p>
           <a:p>
-            <a:pPr lvl="0" indent="0">
+            <a:pPr lvl="0" marL="1270000" indent="0">
               <a:buNone/>
             </a:pPr>
             <a:r>
-              <a:rPr>
+              <a:rPr sz="1800">
                 <a:latin typeface="Courier"/>
               </a:rPr>
               <a:t>## [1] "the"</a:t>
             </a:r>
           </a:p>
           <a:p>
-            <a:pPr lvl="0" indent="0">
+            <a:pPr lvl="0" marL="1270000" indent="0">
               <a:buNone/>
             </a:pPr>
             <a:r>
-              <a:rPr b="1">
+              <a:rPr sz="1800" b="1">
                 <a:solidFill>
                   <a:srgbClr val="007020"/>
                 </a:solidFill>
@@ -7401,13 +7401,13 @@
               <a:t>print</a:t>
             </a:r>
             <a:r>
-              <a:rPr>
+              <a:rPr sz="1800">
                 <a:latin typeface="Courier"/>
               </a:rPr>
               <a:t>(x[</a:t>
             </a:r>
             <a:r>
-              <a:rPr>
+              <a:rPr sz="1800">
                 <a:solidFill>
                   <a:srgbClr val="40A070"/>
                 </a:solidFill>
@@ -7416,29 +7416,29 @@
               <a:t>2</a:t>
             </a:r>
             <a:r>
-              <a:rPr>
+              <a:rPr sz="1800">
                 <a:latin typeface="Courier"/>
               </a:rPr>
               <a:t>])</a:t>
             </a:r>
           </a:p>
           <a:p>
-            <a:pPr lvl="0" indent="0">
+            <a:pPr lvl="0" marL="1270000" indent="0">
               <a:buNone/>
             </a:pPr>
             <a:r>
-              <a:rPr>
+              <a:rPr sz="1800">
                 <a:latin typeface="Courier"/>
               </a:rPr>
               <a:t>## [1] "classic"</a:t>
             </a:r>
           </a:p>
           <a:p>
-            <a:pPr lvl="0" indent="0">
+            <a:pPr lvl="0" marL="1270000" indent="0">
               <a:buNone/>
             </a:pPr>
             <a:r>
-              <a:rPr b="1">
+              <a:rPr sz="1800" b="1">
                 <a:solidFill>
                   <a:srgbClr val="007020"/>
                 </a:solidFill>
@@ -7447,13 +7447,13 @@
               <a:t>print</a:t>
             </a:r>
             <a:r>
-              <a:rPr>
+              <a:rPr sz="1800">
                 <a:latin typeface="Courier"/>
               </a:rPr>
               <a:t>(x[</a:t>
             </a:r>
             <a:r>
-              <a:rPr>
+              <a:rPr sz="1800">
                 <a:solidFill>
                   <a:srgbClr val="40A070"/>
                 </a:solidFill>
@@ -7462,29 +7462,29 @@
               <a:t>3</a:t>
             </a:r>
             <a:r>
-              <a:rPr>
+              <a:rPr sz="1800">
                 <a:latin typeface="Courier"/>
               </a:rPr>
               <a:t>])</a:t>
             </a:r>
           </a:p>
           <a:p>
-            <a:pPr lvl="0" indent="0">
+            <a:pPr lvl="0" marL="1270000" indent="0">
               <a:buNone/>
             </a:pPr>
             <a:r>
-              <a:rPr>
+              <a:rPr sz="1800">
                 <a:latin typeface="Courier"/>
               </a:rPr>
               <a:t>## [1] "hello"</a:t>
             </a:r>
           </a:p>
           <a:p>
-            <a:pPr lvl="0" indent="0">
+            <a:pPr lvl="0" marL="1270000" indent="0">
               <a:buNone/>
             </a:pPr>
             <a:r>
-              <a:rPr b="1">
+              <a:rPr sz="1800" b="1">
                 <a:solidFill>
                   <a:srgbClr val="007020"/>
                 </a:solidFill>
@@ -7493,13 +7493,13 @@
               <a:t>print</a:t>
             </a:r>
             <a:r>
-              <a:rPr>
+              <a:rPr sz="1800">
                 <a:latin typeface="Courier"/>
               </a:rPr>
               <a:t>(x[</a:t>
             </a:r>
             <a:r>
-              <a:rPr>
+              <a:rPr sz="1800">
                 <a:solidFill>
                   <a:srgbClr val="40A070"/>
                 </a:solidFill>
@@ -7508,29 +7508,29 @@
               <a:t>4</a:t>
             </a:r>
             <a:r>
-              <a:rPr>
+              <a:rPr sz="1800">
                 <a:latin typeface="Courier"/>
               </a:rPr>
               <a:t>])</a:t>
             </a:r>
           </a:p>
           <a:p>
-            <a:pPr lvl="0" indent="0">
+            <a:pPr lvl="0" marL="1270000" indent="0">
               <a:buNone/>
             </a:pPr>
             <a:r>
-              <a:rPr>
+              <a:rPr sz="1800">
                 <a:latin typeface="Courier"/>
               </a:rPr>
               <a:t>## [1] "world"</a:t>
             </a:r>
           </a:p>
           <a:p>
-            <a:pPr lvl="0" indent="0">
+            <a:pPr lvl="0" marL="1270000" indent="0">
               <a:buNone/>
             </a:pPr>
             <a:r>
-              <a:rPr b="1">
+              <a:rPr sz="1800" b="1">
                 <a:solidFill>
                   <a:srgbClr val="007020"/>
                 </a:solidFill>
@@ -7539,13 +7539,13 @@
               <a:t>print</a:t>
             </a:r>
             <a:r>
-              <a:rPr>
+              <a:rPr sz="1800">
                 <a:latin typeface="Courier"/>
               </a:rPr>
               <a:t>(x[</a:t>
             </a:r>
             <a:r>
-              <a:rPr>
+              <a:rPr sz="1800">
                 <a:solidFill>
                   <a:srgbClr val="40A070"/>
                 </a:solidFill>
@@ -7554,18 +7554,18 @@
               <a:t>5</a:t>
             </a:r>
             <a:r>
-              <a:rPr>
+              <a:rPr sz="1800">
                 <a:latin typeface="Courier"/>
               </a:rPr>
               <a:t>])</a:t>
             </a:r>
           </a:p>
           <a:p>
-            <a:pPr lvl="0" indent="0">
+            <a:pPr lvl="0" marL="1270000" indent="0">
               <a:buNone/>
             </a:pPr>
             <a:r>
-              <a:rPr>
+              <a:rPr sz="1800">
                 <a:latin typeface="Courier"/>
               </a:rPr>
               <a:t>## [1] "example"</a:t>
@@ -7671,17 +7671,17 @@
           <a:bodyPr/>
           <a:lstStyle/>
           <a:p>
-            <a:pPr lvl="0" indent="0">
+            <a:pPr lvl="0" marL="1270000" indent="0">
               <a:buNone/>
             </a:pPr>
             <a:r>
-              <a:rPr>
+              <a:rPr sz="1800">
                 <a:latin typeface="Courier"/>
               </a:rPr>
               <a:t>x &lt;-</a:t>
             </a:r>
             <a:r>
-              <a:rPr>
+              <a:rPr sz="1800">
                 <a:solidFill>
                   <a:srgbClr val="4070A0"/>
                 </a:solidFill>
@@ -7690,7 +7690,7 @@
               <a:t> </a:t>
             </a:r>
             <a:r>
-              <a:rPr b="1">
+              <a:rPr sz="1800" b="1">
                 <a:solidFill>
                   <a:srgbClr val="007020"/>
                 </a:solidFill>
@@ -7699,13 +7699,13 @@
               <a:t>c</a:t>
             </a:r>
             <a:r>
-              <a:rPr>
+              <a:rPr sz="1800">
                 <a:latin typeface="Courier"/>
               </a:rPr>
               <a:t>(</a:t>
             </a:r>
             <a:r>
-              <a:rPr>
+              <a:rPr sz="1800">
                 <a:solidFill>
                   <a:srgbClr val="4070A0"/>
                 </a:solidFill>
@@ -7714,13 +7714,13 @@
               <a:t>"the"</a:t>
             </a:r>
             <a:r>
-              <a:rPr>
+              <a:rPr sz="1800">
                 <a:latin typeface="Courier"/>
               </a:rPr>
               <a:t>, </a:t>
             </a:r>
             <a:r>
-              <a:rPr>
+              <a:rPr sz="1800">
                 <a:solidFill>
                   <a:srgbClr val="4070A0"/>
                 </a:solidFill>
@@ -7729,13 +7729,13 @@
               <a:t>"classic"</a:t>
             </a:r>
             <a:r>
-              <a:rPr>
+              <a:rPr sz="1800">
                 <a:latin typeface="Courier"/>
               </a:rPr>
               <a:t>, </a:t>
             </a:r>
             <a:r>
-              <a:rPr>
+              <a:rPr sz="1800">
                 <a:solidFill>
                   <a:srgbClr val="4070A0"/>
                 </a:solidFill>
@@ -7744,13 +7744,13 @@
               <a:t>"hello"</a:t>
             </a:r>
             <a:r>
-              <a:rPr>
+              <a:rPr sz="1800">
                 <a:latin typeface="Courier"/>
               </a:rPr>
               <a:t>, </a:t>
             </a:r>
             <a:r>
-              <a:rPr>
+              <a:rPr sz="1800">
                 <a:solidFill>
                   <a:srgbClr val="4070A0"/>
                 </a:solidFill>
@@ -7759,13 +7759,13 @@
               <a:t>"world"</a:t>
             </a:r>
             <a:r>
-              <a:rPr>
+              <a:rPr sz="1800">
                 <a:latin typeface="Courier"/>
               </a:rPr>
               <a:t>, </a:t>
             </a:r>
             <a:r>
-              <a:rPr>
+              <a:rPr sz="1800">
                 <a:solidFill>
                   <a:srgbClr val="4070A0"/>
                 </a:solidFill>
@@ -7774,7 +7774,7 @@
               <a:t>"example"</a:t>
             </a:r>
             <a:r>
-              <a:rPr>
+              <a:rPr sz="1800">
                 <a:latin typeface="Courier"/>
               </a:rPr>
               <a:t>)</a:t>
@@ -7782,7 +7782,7 @@
             <a:br/>
             <a:br/>
             <a:r>
-              <a:rPr b="1">
+              <a:rPr sz="1800" b="1">
                 <a:solidFill>
                   <a:srgbClr val="007020"/>
                 </a:solidFill>
@@ -7791,13 +7791,13 @@
               <a:t>for</a:t>
             </a:r>
             <a:r>
-              <a:rPr>
+              <a:rPr sz="1800">
                 <a:latin typeface="Courier"/>
               </a:rPr>
               <a:t>(i </a:t>
             </a:r>
             <a:r>
-              <a:rPr b="1">
+              <a:rPr sz="1800" b="1">
                 <a:solidFill>
                   <a:srgbClr val="007020"/>
                 </a:solidFill>
@@ -7806,13 +7806,13 @@
               <a:t>in</a:t>
             </a:r>
             <a:r>
-              <a:rPr>
-                <a:latin typeface="Courier"/>
-              </a:rPr>
-              <a:t> </a:t>
-            </a:r>
-            <a:r>
-              <a:rPr>
+              <a:rPr sz="1800">
+                <a:latin typeface="Courier"/>
+              </a:rPr>
+              <a:t> </a:t>
+            </a:r>
+            <a:r>
+              <a:rPr sz="1800">
                 <a:solidFill>
                   <a:srgbClr val="40A070"/>
                 </a:solidFill>
@@ -7821,7 +7821,7 @@
               <a:t>1</a:t>
             </a:r>
             <a:r>
-              <a:rPr>
+              <a:rPr sz="1800">
                 <a:solidFill>
                   <a:srgbClr val="666666"/>
                 </a:solidFill>
@@ -7830,7 +7830,7 @@
               <a:t>:</a:t>
             </a:r>
             <a:r>
-              <a:rPr>
+              <a:rPr sz="1800">
                 <a:solidFill>
                   <a:srgbClr val="40A070"/>
                 </a:solidFill>
@@ -7839,27 +7839,27 @@
               <a:t>5</a:t>
             </a:r>
             <a:r>
-              <a:rPr>
+              <a:rPr sz="1800">
                 <a:latin typeface="Courier"/>
               </a:rPr>
               <a:t>){</a:t>
             </a:r>
             <a:br/>
             <a:r>
-              <a:rPr>
+              <a:rPr sz="1800">
                 <a:latin typeface="Courier"/>
               </a:rPr>
               <a:t>  </a:t>
             </a:r>
             <a:br/>
             <a:r>
-              <a:rPr>
+              <a:rPr sz="1800">
                 <a:latin typeface="Courier"/>
               </a:rPr>
               <a:t>  </a:t>
             </a:r>
             <a:r>
-              <a:rPr b="1">
+              <a:rPr sz="1800" b="1">
                 <a:solidFill>
                   <a:srgbClr val="007020"/>
                 </a:solidFill>
@@ -7868,32 +7868,32 @@
               <a:t>print</a:t>
             </a:r>
             <a:r>
-              <a:rPr>
+              <a:rPr sz="1800">
                 <a:latin typeface="Courier"/>
               </a:rPr>
               <a:t>(x[i])</a:t>
             </a:r>
             <a:br/>
             <a:r>
-              <a:rPr>
+              <a:rPr sz="1800">
                 <a:latin typeface="Courier"/>
               </a:rPr>
               <a:t>  </a:t>
             </a:r>
             <a:br/>
             <a:r>
-              <a:rPr>
+              <a:rPr sz="1800">
                 <a:latin typeface="Courier"/>
               </a:rPr>
               <a:t>}</a:t>
             </a:r>
           </a:p>
           <a:p>
-            <a:pPr lvl="0" indent="0">
+            <a:pPr lvl="0" marL="1270000" indent="0">
               <a:buNone/>
             </a:pPr>
             <a:r>
-              <a:rPr>
+              <a:rPr sz="1800">
                 <a:latin typeface="Courier"/>
               </a:rPr>
               <a:t>## [1] "the"
@@ -7993,7 +7993,7 @@
               <a:t>Write a loop that iterates across every column of </a:t>
             </a:r>
             <a:r>
-              <a:rPr>
+              <a:rPr sz="1800">
                 <a:latin typeface="Courier"/>
               </a:rPr>
               <a:t>cchic</a:t>
@@ -8010,7 +8010,7 @@
               <a:t>Hint: </a:t>
             </a:r>
             <a:r>
-              <a:rPr>
+              <a:rPr sz="1800">
                 <a:latin typeface="Courier"/>
               </a:rPr>
               <a:t>length(cchic)</a:t>
@@ -8027,7 +8027,7 @@
               <a:t>Hint: </a:t>
             </a:r>
             <a:r>
-              <a:rPr>
+              <a:rPr sz="1800">
                 <a:latin typeface="Courier"/>
               </a:rPr>
               <a:t>print(names(cchic[1]))</a:t>
@@ -8113,11 +8113,11 @@
           <a:bodyPr/>
           <a:lstStyle/>
           <a:p>
-            <a:pPr lvl="0" indent="0">
+            <a:pPr lvl="0" marL="1270000" indent="0">
               <a:buNone/>
             </a:pPr>
             <a:r>
-              <a:rPr b="1">
+              <a:rPr sz="1800" b="1">
                 <a:solidFill>
                   <a:srgbClr val="007020"/>
                 </a:solidFill>
@@ -8126,13 +8126,13 @@
               <a:t>for</a:t>
             </a:r>
             <a:r>
-              <a:rPr>
+              <a:rPr sz="1800">
                 <a:latin typeface="Courier"/>
               </a:rPr>
               <a:t>(i </a:t>
             </a:r>
             <a:r>
-              <a:rPr b="1">
+              <a:rPr sz="1800" b="1">
                 <a:solidFill>
                   <a:srgbClr val="007020"/>
                 </a:solidFill>
@@ -8141,13 +8141,13 @@
               <a:t>in</a:t>
             </a:r>
             <a:r>
-              <a:rPr>
-                <a:latin typeface="Courier"/>
-              </a:rPr>
-              <a:t> </a:t>
-            </a:r>
-            <a:r>
-              <a:rPr>
+              <a:rPr sz="1800">
+                <a:latin typeface="Courier"/>
+              </a:rPr>
+              <a:t> </a:t>
+            </a:r>
+            <a:r>
+              <a:rPr sz="1800">
                 <a:solidFill>
                   <a:srgbClr val="40A070"/>
                 </a:solidFill>
@@ -8156,7 +8156,7 @@
               <a:t>1</a:t>
             </a:r>
             <a:r>
-              <a:rPr>
+              <a:rPr sz="1800">
                 <a:solidFill>
                   <a:srgbClr val="666666"/>
                 </a:solidFill>
@@ -8165,7 +8165,7 @@
               <a:t>:</a:t>
             </a:r>
             <a:r>
-              <a:rPr b="1">
+              <a:rPr sz="1800" b="1">
                 <a:solidFill>
                   <a:srgbClr val="007020"/>
                 </a:solidFill>
@@ -8174,27 +8174,27 @@
               <a:t>length</a:t>
             </a:r>
             <a:r>
-              <a:rPr>
+              <a:rPr sz="1800">
                 <a:latin typeface="Courier"/>
               </a:rPr>
               <a:t>(cchic)){</a:t>
             </a:r>
             <a:br/>
             <a:r>
-              <a:rPr>
+              <a:rPr sz="1800">
                 <a:latin typeface="Courier"/>
               </a:rPr>
               <a:t>  </a:t>
             </a:r>
             <a:br/>
             <a:r>
-              <a:rPr>
+              <a:rPr sz="1800">
                 <a:latin typeface="Courier"/>
               </a:rPr>
               <a:t>  </a:t>
             </a:r>
             <a:r>
-              <a:rPr b="1">
+              <a:rPr sz="1800" b="1">
                 <a:solidFill>
                   <a:srgbClr val="007020"/>
                 </a:solidFill>
@@ -8203,13 +8203,13 @@
               <a:t>print</a:t>
             </a:r>
             <a:r>
-              <a:rPr>
+              <a:rPr sz="1800">
                 <a:latin typeface="Courier"/>
               </a:rPr>
               <a:t>(</a:t>
             </a:r>
             <a:r>
-              <a:rPr b="1">
+              <a:rPr sz="1800" b="1">
                 <a:solidFill>
                   <a:srgbClr val="007020"/>
                 </a:solidFill>
@@ -8218,21 +8218,21 @@
               <a:t>names</a:t>
             </a:r>
             <a:r>
-              <a:rPr>
+              <a:rPr sz="1800">
                 <a:latin typeface="Courier"/>
               </a:rPr>
               <a:t>(cchic[i]))</a:t>
             </a:r>
             <a:br/>
             <a:r>
-              <a:rPr>
+              <a:rPr sz="1800">
                 <a:latin typeface="Courier"/>
               </a:rPr>
               <a:t>  </a:t>
             </a:r>
             <a:br/>
             <a:r>
-              <a:rPr>
+              <a:rPr sz="1800">
                 <a:latin typeface="Courier"/>
               </a:rPr>
               <a:t>}</a:t>
@@ -8436,11 +8436,11 @@
           <a:bodyPr/>
           <a:lstStyle/>
           <a:p>
-            <a:pPr lvl="0" indent="0">
+            <a:pPr lvl="0" marL="1270000" indent="0">
               <a:buNone/>
             </a:pPr>
             <a:r>
-              <a:rPr b="1">
+              <a:rPr sz="1800" b="1">
                 <a:solidFill>
                   <a:srgbClr val="007020"/>
                 </a:solidFill>
@@ -8449,13 +8449,13 @@
               <a:t>for</a:t>
             </a:r>
             <a:r>
-              <a:rPr>
+              <a:rPr sz="1800">
                 <a:latin typeface="Courier"/>
               </a:rPr>
               <a:t>(i </a:t>
             </a:r>
             <a:r>
-              <a:rPr b="1">
+              <a:rPr sz="1800" b="1">
                 <a:solidFill>
                   <a:srgbClr val="007020"/>
                 </a:solidFill>
@@ -8464,13 +8464,13 @@
               <a:t>in</a:t>
             </a:r>
             <a:r>
-              <a:rPr>
-                <a:latin typeface="Courier"/>
-              </a:rPr>
-              <a:t> </a:t>
-            </a:r>
-            <a:r>
-              <a:rPr>
+              <a:rPr sz="1800">
+                <a:latin typeface="Courier"/>
+              </a:rPr>
+              <a:t> </a:t>
+            </a:r>
+            <a:r>
+              <a:rPr sz="1800">
                 <a:solidFill>
                   <a:srgbClr val="40A070"/>
                 </a:solidFill>
@@ -8479,7 +8479,7 @@
               <a:t>1</a:t>
             </a:r>
             <a:r>
-              <a:rPr>
+              <a:rPr sz="1800">
                 <a:solidFill>
                   <a:srgbClr val="666666"/>
                 </a:solidFill>
@@ -8488,7 +8488,7 @@
               <a:t>:</a:t>
             </a:r>
             <a:r>
-              <a:rPr>
+              <a:rPr sz="1800">
                 <a:solidFill>
                   <a:srgbClr val="40A070"/>
                 </a:solidFill>
@@ -8497,27 +8497,27 @@
               <a:t>5</a:t>
             </a:r>
             <a:r>
-              <a:rPr>
+              <a:rPr sz="1800">
                 <a:latin typeface="Courier"/>
               </a:rPr>
               <a:t>){</a:t>
             </a:r>
             <a:br/>
             <a:r>
-              <a:rPr>
+              <a:rPr sz="1800">
                 <a:latin typeface="Courier"/>
               </a:rPr>
               <a:t>  </a:t>
             </a:r>
             <a:br/>
             <a:r>
-              <a:rPr>
+              <a:rPr sz="1800">
                 <a:latin typeface="Courier"/>
               </a:rPr>
               <a:t>  </a:t>
             </a:r>
             <a:r>
-              <a:rPr b="1">
+              <a:rPr sz="1800" b="1">
                 <a:solidFill>
                   <a:srgbClr val="007020"/>
                 </a:solidFill>
@@ -8526,13 +8526,13 @@
               <a:t>if</a:t>
             </a:r>
             <a:r>
-              <a:rPr>
+              <a:rPr sz="1800">
                 <a:latin typeface="Courier"/>
               </a:rPr>
               <a:t>(i </a:t>
             </a:r>
             <a:r>
-              <a:rPr>
+              <a:rPr sz="1800">
                 <a:solidFill>
                   <a:srgbClr val="666666"/>
                 </a:solidFill>
@@ -8541,7 +8541,7 @@
               <a:t>==</a:t>
             </a:r>
             <a:r>
-              <a:rPr>
+              <a:rPr sz="1800">
                 <a:solidFill>
                   <a:srgbClr val="4070A0"/>
                 </a:solidFill>
@@ -8550,7 +8550,7 @@
               <a:t> </a:t>
             </a:r>
             <a:r>
-              <a:rPr>
+              <a:rPr sz="1800">
                 <a:solidFill>
                   <a:srgbClr val="40A070"/>
                 </a:solidFill>
@@ -8559,27 +8559,27 @@
               <a:t>1</a:t>
             </a:r>
             <a:r>
-              <a:rPr>
+              <a:rPr sz="1800">
                 <a:latin typeface="Courier"/>
               </a:rPr>
               <a:t>){</a:t>
             </a:r>
             <a:br/>
             <a:r>
-              <a:rPr>
+              <a:rPr sz="1800">
                 <a:latin typeface="Courier"/>
               </a:rPr>
               <a:t>    </a:t>
             </a:r>
             <a:br/>
             <a:r>
-              <a:rPr>
+              <a:rPr sz="1800">
                 <a:latin typeface="Courier"/>
               </a:rPr>
               <a:t>    </a:t>
             </a:r>
             <a:r>
-              <a:rPr b="1">
+              <a:rPr sz="1800" b="1">
                 <a:solidFill>
                   <a:srgbClr val="007020"/>
                 </a:solidFill>
@@ -8588,13 +8588,13 @@
               <a:t>print</a:t>
             </a:r>
             <a:r>
-              <a:rPr>
+              <a:rPr sz="1800">
                 <a:latin typeface="Courier"/>
               </a:rPr>
               <a:t>(</a:t>
             </a:r>
             <a:r>
-              <a:rPr>
+              <a:rPr sz="1800">
                 <a:solidFill>
                   <a:srgbClr val="4070A0"/>
                 </a:solidFill>
@@ -8603,27 +8603,27 @@
               <a:t>"one"</a:t>
             </a:r>
             <a:r>
-              <a:rPr>
+              <a:rPr sz="1800">
                 <a:latin typeface="Courier"/>
               </a:rPr>
               <a:t>)</a:t>
             </a:r>
             <a:br/>
             <a:r>
-              <a:rPr>
+              <a:rPr sz="1800">
                 <a:latin typeface="Courier"/>
               </a:rPr>
               <a:t>    </a:t>
             </a:r>
             <a:br/>
             <a:r>
-              <a:rPr>
+              <a:rPr sz="1800">
                 <a:latin typeface="Courier"/>
               </a:rPr>
               <a:t>  }</a:t>
             </a:r>
             <a:r>
-              <a:rPr b="1">
+              <a:rPr sz="1800" b="1">
                 <a:solidFill>
                   <a:srgbClr val="007020"/>
                 </a:solidFill>
@@ -8632,27 +8632,27 @@
               <a:t>else</a:t>
             </a:r>
             <a:r>
-              <a:rPr>
+              <a:rPr sz="1800">
                 <a:latin typeface="Courier"/>
               </a:rPr>
               <a:t>{</a:t>
             </a:r>
             <a:br/>
             <a:r>
-              <a:rPr>
+              <a:rPr sz="1800">
                 <a:latin typeface="Courier"/>
               </a:rPr>
               <a:t>    </a:t>
             </a:r>
             <a:br/>
             <a:r>
-              <a:rPr>
+              <a:rPr sz="1800">
                 <a:latin typeface="Courier"/>
               </a:rPr>
               <a:t>    </a:t>
             </a:r>
             <a:r>
-              <a:rPr b="1">
+              <a:rPr sz="1800" b="1">
                 <a:solidFill>
                   <a:srgbClr val="007020"/>
                 </a:solidFill>
@@ -8661,39 +8661,39 @@
               <a:t>print</a:t>
             </a:r>
             <a:r>
-              <a:rPr>
+              <a:rPr sz="1800">
                 <a:latin typeface="Courier"/>
               </a:rPr>
               <a:t>(i)</a:t>
             </a:r>
             <a:br/>
             <a:r>
-              <a:rPr>
+              <a:rPr sz="1800">
                 <a:latin typeface="Courier"/>
               </a:rPr>
               <a:t>    </a:t>
             </a:r>
             <a:br/>
             <a:r>
-              <a:rPr>
+              <a:rPr sz="1800">
                 <a:latin typeface="Courier"/>
               </a:rPr>
               <a:t>  }</a:t>
             </a:r>
             <a:br/>
             <a:r>
-              <a:rPr>
+              <a:rPr sz="1800">
                 <a:latin typeface="Courier"/>
               </a:rPr>
               <a:t>}</a:t>
             </a:r>
           </a:p>
           <a:p>
-            <a:pPr lvl="0" indent="0">
+            <a:pPr lvl="0" marL="1270000" indent="0">
               <a:buNone/>
             </a:pPr>
             <a:r>
-              <a:rPr>
+              <a:rPr sz="1800">
                 <a:latin typeface="Courier"/>
               </a:rPr>
               <a:t>## [1] "one"
@@ -8787,11 +8787,11 @@
           <a:bodyPr/>
           <a:lstStyle/>
           <a:p>
-            <a:pPr lvl="0" indent="0">
+            <a:pPr lvl="0" marL="1270000" indent="0">
               <a:buNone/>
             </a:pPr>
             <a:r>
-              <a:rPr b="1">
+              <a:rPr sz="1800" b="1">
                 <a:solidFill>
                   <a:srgbClr val="007020"/>
                 </a:solidFill>
@@ -8800,13 +8800,13 @@
               <a:t>for</a:t>
             </a:r>
             <a:r>
-              <a:rPr>
+              <a:rPr sz="1800">
                 <a:latin typeface="Courier"/>
               </a:rPr>
               <a:t>(i </a:t>
             </a:r>
             <a:r>
-              <a:rPr b="1">
+              <a:rPr sz="1800" b="1">
                 <a:solidFill>
                   <a:srgbClr val="007020"/>
                 </a:solidFill>
@@ -8815,13 +8815,13 @@
               <a:t>in</a:t>
             </a:r>
             <a:r>
-              <a:rPr>
-                <a:latin typeface="Courier"/>
-              </a:rPr>
-              <a:t> </a:t>
-            </a:r>
-            <a:r>
-              <a:rPr>
+              <a:rPr sz="1800">
+                <a:latin typeface="Courier"/>
+              </a:rPr>
+              <a:t> </a:t>
+            </a:r>
+            <a:r>
+              <a:rPr sz="1800">
                 <a:solidFill>
                   <a:srgbClr val="40A070"/>
                 </a:solidFill>
@@ -8830,7 +8830,7 @@
               <a:t>1</a:t>
             </a:r>
             <a:r>
-              <a:rPr>
+              <a:rPr sz="1800">
                 <a:solidFill>
                   <a:srgbClr val="666666"/>
                 </a:solidFill>
@@ -8839,7 +8839,7 @@
               <a:t>:</a:t>
             </a:r>
             <a:r>
-              <a:rPr>
+              <a:rPr sz="1800">
                 <a:solidFill>
                   <a:srgbClr val="40A070"/>
                 </a:solidFill>
@@ -8848,27 +8848,27 @@
               <a:t>5</a:t>
             </a:r>
             <a:r>
-              <a:rPr>
+              <a:rPr sz="1800">
                 <a:latin typeface="Courier"/>
               </a:rPr>
               <a:t>){</a:t>
             </a:r>
             <a:br/>
             <a:r>
-              <a:rPr>
+              <a:rPr sz="1800">
                 <a:latin typeface="Courier"/>
               </a:rPr>
               <a:t>  </a:t>
             </a:r>
             <a:br/>
             <a:r>
-              <a:rPr>
+              <a:rPr sz="1800">
                 <a:latin typeface="Courier"/>
               </a:rPr>
               <a:t>  </a:t>
             </a:r>
             <a:r>
-              <a:rPr i="1">
+              <a:rPr sz="1800" i="1">
                 <a:solidFill>
                   <a:srgbClr val="60A0B0"/>
                 </a:solidFill>
@@ -8878,13 +8878,13 @@
             </a:r>
             <a:br/>
             <a:r>
-              <a:rPr>
+              <a:rPr sz="1800">
                 <a:latin typeface="Courier"/>
               </a:rPr>
               <a:t>  </a:t>
             </a:r>
             <a:r>
-              <a:rPr b="1">
+              <a:rPr sz="1800" b="1">
                 <a:solidFill>
                   <a:srgbClr val="007020"/>
                 </a:solidFill>
@@ -8893,13 +8893,13 @@
               <a:t>if</a:t>
             </a:r>
             <a:r>
-              <a:rPr>
+              <a:rPr sz="1800">
                 <a:latin typeface="Courier"/>
               </a:rPr>
               <a:t>(i </a:t>
             </a:r>
             <a:r>
-              <a:rPr>
+              <a:rPr sz="1800">
                 <a:solidFill>
                   <a:srgbClr val="666666"/>
                 </a:solidFill>
@@ -8908,7 +8908,7 @@
               <a:t>%%</a:t>
             </a:r>
             <a:r>
-              <a:rPr>
+              <a:rPr sz="1800">
                 <a:solidFill>
                   <a:srgbClr val="4070A0"/>
                 </a:solidFill>
@@ -8917,7 +8917,7 @@
               <a:t> </a:t>
             </a:r>
             <a:r>
-              <a:rPr>
+              <a:rPr sz="1800">
                 <a:solidFill>
                   <a:srgbClr val="40A070"/>
                 </a:solidFill>
@@ -8926,13 +8926,13 @@
               <a:t>2</a:t>
             </a:r>
             <a:r>
-              <a:rPr>
-                <a:latin typeface="Courier"/>
-              </a:rPr>
-              <a:t> </a:t>
-            </a:r>
-            <a:r>
-              <a:rPr>
+              <a:rPr sz="1800">
+                <a:latin typeface="Courier"/>
+              </a:rPr>
+              <a:t> </a:t>
+            </a:r>
+            <a:r>
+              <a:rPr sz="1800">
                 <a:solidFill>
                   <a:srgbClr val="666666"/>
                 </a:solidFill>
@@ -8941,7 +8941,7 @@
               <a:t>==</a:t>
             </a:r>
             <a:r>
-              <a:rPr>
+              <a:rPr sz="1800">
                 <a:solidFill>
                   <a:srgbClr val="4070A0"/>
                 </a:solidFill>
@@ -8950,7 +8950,7 @@
               <a:t> </a:t>
             </a:r>
             <a:r>
-              <a:rPr>
+              <a:rPr sz="1800">
                 <a:solidFill>
                   <a:srgbClr val="40A070"/>
                 </a:solidFill>
@@ -8959,27 +8959,27 @@
               <a:t>0</a:t>
             </a:r>
             <a:r>
-              <a:rPr>
+              <a:rPr sz="1800">
                 <a:latin typeface="Courier"/>
               </a:rPr>
               <a:t>){</a:t>
             </a:r>
             <a:br/>
             <a:r>
-              <a:rPr>
+              <a:rPr sz="1800">
                 <a:latin typeface="Courier"/>
               </a:rPr>
               <a:t>    </a:t>
             </a:r>
             <a:br/>
             <a:r>
-              <a:rPr>
+              <a:rPr sz="1800">
                 <a:latin typeface="Courier"/>
               </a:rPr>
               <a:t>    </a:t>
             </a:r>
             <a:r>
-              <a:rPr b="1">
+              <a:rPr sz="1800" b="1">
                 <a:solidFill>
                   <a:srgbClr val="007020"/>
                 </a:solidFill>
@@ -8988,13 +8988,13 @@
               <a:t>print</a:t>
             </a:r>
             <a:r>
-              <a:rPr>
+              <a:rPr sz="1800">
                 <a:latin typeface="Courier"/>
               </a:rPr>
               <a:t>(</a:t>
             </a:r>
             <a:r>
-              <a:rPr>
+              <a:rPr sz="1800">
                 <a:solidFill>
                   <a:srgbClr val="4070A0"/>
                 </a:solidFill>
@@ -9003,27 +9003,27 @@
               <a:t>"even"</a:t>
             </a:r>
             <a:r>
-              <a:rPr>
+              <a:rPr sz="1800">
                 <a:latin typeface="Courier"/>
               </a:rPr>
               <a:t>)</a:t>
             </a:r>
             <a:br/>
             <a:r>
-              <a:rPr>
+              <a:rPr sz="1800">
                 <a:latin typeface="Courier"/>
               </a:rPr>
               <a:t>    </a:t>
             </a:r>
             <a:br/>
             <a:r>
-              <a:rPr>
+              <a:rPr sz="1800">
                 <a:latin typeface="Courier"/>
               </a:rPr>
               <a:t>  }</a:t>
             </a:r>
             <a:r>
-              <a:rPr b="1">
+              <a:rPr sz="1800" b="1">
                 <a:solidFill>
                   <a:srgbClr val="007020"/>
                 </a:solidFill>
@@ -9032,27 +9032,27 @@
               <a:t>else</a:t>
             </a:r>
             <a:r>
-              <a:rPr>
+              <a:rPr sz="1800">
                 <a:latin typeface="Courier"/>
               </a:rPr>
               <a:t>{</a:t>
             </a:r>
             <a:br/>
             <a:r>
-              <a:rPr>
+              <a:rPr sz="1800">
                 <a:latin typeface="Courier"/>
               </a:rPr>
               <a:t>    </a:t>
             </a:r>
             <a:br/>
             <a:r>
-              <a:rPr>
+              <a:rPr sz="1800">
                 <a:latin typeface="Courier"/>
               </a:rPr>
               <a:t>    </a:t>
             </a:r>
             <a:r>
-              <a:rPr b="1">
+              <a:rPr sz="1800" b="1">
                 <a:solidFill>
                   <a:srgbClr val="007020"/>
                 </a:solidFill>
@@ -9061,13 +9061,13 @@
               <a:t>print</a:t>
             </a:r>
             <a:r>
-              <a:rPr>
+              <a:rPr sz="1800">
                 <a:latin typeface="Courier"/>
               </a:rPr>
               <a:t>(</a:t>
             </a:r>
             <a:r>
-              <a:rPr>
+              <a:rPr sz="1800">
                 <a:solidFill>
                   <a:srgbClr val="4070A0"/>
                 </a:solidFill>
@@ -9076,39 +9076,39 @@
               <a:t>"odd"</a:t>
             </a:r>
             <a:r>
-              <a:rPr>
+              <a:rPr sz="1800">
                 <a:latin typeface="Courier"/>
               </a:rPr>
               <a:t>)</a:t>
             </a:r>
             <a:br/>
             <a:r>
-              <a:rPr>
+              <a:rPr sz="1800">
                 <a:latin typeface="Courier"/>
               </a:rPr>
               <a:t>    </a:t>
             </a:r>
             <a:br/>
             <a:r>
-              <a:rPr>
+              <a:rPr sz="1800">
                 <a:latin typeface="Courier"/>
               </a:rPr>
               <a:t>  }</a:t>
             </a:r>
             <a:br/>
             <a:r>
-              <a:rPr>
+              <a:rPr sz="1800">
                 <a:latin typeface="Courier"/>
               </a:rPr>
               <a:t>}</a:t>
             </a:r>
           </a:p>
           <a:p>
-            <a:pPr lvl="0" indent="0">
+            <a:pPr lvl="0" marL="1270000" indent="0">
               <a:buNone/>
             </a:pPr>
             <a:r>
-              <a:rPr>
+              <a:rPr sz="1800">
                 <a:latin typeface="Courier"/>
               </a:rPr>
               <a:t>## [1] "odd"
@@ -9308,7 +9308,7 @@
               <a:t>Question: How do we calculate the mean of every numeric variable in </a:t>
             </a:r>
             <a:r>
-              <a:rPr>
+              <a:rPr sz="1800">
                 <a:latin typeface="Courier"/>
               </a:rPr>
               <a:t>chicc</a:t>
@@ -9332,7 +9332,7 @@
               <a:t>Hint: to check whether something is a numeric variable use </a:t>
             </a:r>
             <a:r>
-              <a:rPr>
+              <a:rPr sz="1800">
                 <a:latin typeface="Courier"/>
               </a:rPr>
               <a:t>is.numeric()</a:t>
@@ -9430,11 +9430,11 @@
           <a:bodyPr/>
           <a:lstStyle/>
           <a:p>
-            <a:pPr lvl="0" indent="0">
+            <a:pPr lvl="0" marL="1270000" indent="0">
               <a:buNone/>
             </a:pPr>
             <a:r>
-              <a:rPr b="1">
+              <a:rPr sz="1800" b="1">
                 <a:solidFill>
                   <a:srgbClr val="007020"/>
                 </a:solidFill>
@@ -9443,13 +9443,13 @@
               <a:t>print</a:t>
             </a:r>
             <a:r>
-              <a:rPr>
+              <a:rPr sz="1800">
                 <a:latin typeface="Courier"/>
               </a:rPr>
               <a:t>(</a:t>
             </a:r>
             <a:r>
-              <a:rPr b="1">
+              <a:rPr sz="1800" b="1">
                 <a:solidFill>
                   <a:srgbClr val="007020"/>
                 </a:solidFill>
@@ -9458,13 +9458,13 @@
               <a:t>mean</a:t>
             </a:r>
             <a:r>
-              <a:rPr>
+              <a:rPr sz="1800">
                 <a:latin typeface="Courier"/>
               </a:rPr>
               <a:t>(cchic</a:t>
             </a:r>
             <a:r>
-              <a:rPr>
+              <a:rPr sz="1800">
                 <a:solidFill>
                   <a:srgbClr val="666666"/>
                 </a:solidFill>
@@ -9473,29 +9473,29 @@
               <a:t>$</a:t>
             </a:r>
             <a:r>
-              <a:rPr>
+              <a:rPr sz="1800">
                 <a:latin typeface="Courier"/>
               </a:rPr>
               <a:t>lactate_abg))</a:t>
             </a:r>
           </a:p>
           <a:p>
-            <a:pPr lvl="0" indent="0">
+            <a:pPr lvl="0" marL="1270000" indent="0">
               <a:buNone/>
             </a:pPr>
             <a:r>
-              <a:rPr>
+              <a:rPr sz="1800">
                 <a:latin typeface="Courier"/>
               </a:rPr>
               <a:t>## [1] 2.07398</a:t>
             </a:r>
           </a:p>
           <a:p>
-            <a:pPr lvl="0" indent="0">
+            <a:pPr lvl="0" marL="1270000" indent="0">
               <a:buNone/>
             </a:pPr>
             <a:r>
-              <a:rPr b="1">
+              <a:rPr sz="1800" b="1">
                 <a:solidFill>
                   <a:srgbClr val="007020"/>
                 </a:solidFill>
@@ -9504,13 +9504,13 @@
               <a:t>print</a:t>
             </a:r>
             <a:r>
-              <a:rPr>
+              <a:rPr sz="1800">
                 <a:latin typeface="Courier"/>
               </a:rPr>
               <a:t>(</a:t>
             </a:r>
             <a:r>
-              <a:rPr b="1">
+              <a:rPr sz="1800" b="1">
                 <a:solidFill>
                   <a:srgbClr val="007020"/>
                 </a:solidFill>
@@ -9519,13 +9519,13 @@
               <a:t>mean</a:t>
             </a:r>
             <a:r>
-              <a:rPr>
+              <a:rPr sz="1800">
                 <a:latin typeface="Courier"/>
               </a:rPr>
               <a:t>(cchic</a:t>
             </a:r>
             <a:r>
-              <a:rPr>
+              <a:rPr sz="1800">
                 <a:solidFill>
                   <a:srgbClr val="666666"/>
                 </a:solidFill>
@@ -9534,29 +9534,29 @@
               <a:t>$</a:t>
             </a:r>
             <a:r>
-              <a:rPr>
+              <a:rPr sz="1800">
                 <a:latin typeface="Courier"/>
               </a:rPr>
               <a:t>ph_abg))</a:t>
             </a:r>
           </a:p>
           <a:p>
-            <a:pPr lvl="0" indent="0">
+            <a:pPr lvl="0" marL="1270000" indent="0">
               <a:buNone/>
             </a:pPr>
             <a:r>
-              <a:rPr>
+              <a:rPr sz="1800">
                 <a:latin typeface="Courier"/>
               </a:rPr>
               <a:t>## [1] 7.355328</a:t>
             </a:r>
           </a:p>
           <a:p>
-            <a:pPr lvl="0" indent="0">
+            <a:pPr lvl="0" marL="1270000" indent="0">
               <a:buNone/>
             </a:pPr>
             <a:r>
-              <a:rPr b="1">
+              <a:rPr sz="1800" b="1">
                 <a:solidFill>
                   <a:srgbClr val="007020"/>
                 </a:solidFill>
@@ -9565,13 +9565,13 @@
               <a:t>print</a:t>
             </a:r>
             <a:r>
-              <a:rPr>
+              <a:rPr sz="1800">
                 <a:latin typeface="Courier"/>
               </a:rPr>
               <a:t>(</a:t>
             </a:r>
             <a:r>
-              <a:rPr b="1">
+              <a:rPr sz="1800" b="1">
                 <a:solidFill>
                   <a:srgbClr val="007020"/>
                 </a:solidFill>
@@ -9580,13 +9580,13 @@
               <a:t>mean</a:t>
             </a:r>
             <a:r>
-              <a:rPr>
+              <a:rPr sz="1800">
                 <a:latin typeface="Courier"/>
               </a:rPr>
               <a:t>(cchic</a:t>
             </a:r>
             <a:r>
-              <a:rPr>
+              <a:rPr sz="1800">
                 <a:solidFill>
                   <a:srgbClr val="666666"/>
                 </a:solidFill>
@@ -9595,29 +9595,29 @@
               <a:t>$</a:t>
             </a:r>
             <a:r>
-              <a:rPr>
+              <a:rPr sz="1800">
                 <a:latin typeface="Courier"/>
               </a:rPr>
               <a:t>hco3_abg))</a:t>
             </a:r>
           </a:p>
           <a:p>
-            <a:pPr lvl="0" indent="0">
+            <a:pPr lvl="0" marL="1270000" indent="0">
               <a:buNone/>
             </a:pPr>
             <a:r>
-              <a:rPr>
+              <a:rPr sz="1800">
                 <a:latin typeface="Courier"/>
               </a:rPr>
               <a:t>## [1] 23.25858</a:t>
             </a:r>
           </a:p>
           <a:p>
-            <a:pPr lvl="0" indent="0">
+            <a:pPr lvl="0" marL="1270000" indent="0">
               <a:buNone/>
             </a:pPr>
             <a:r>
-              <a:rPr b="1">
+              <a:rPr sz="1800" b="1">
                 <a:solidFill>
                   <a:srgbClr val="007020"/>
                 </a:solidFill>
@@ -9626,13 +9626,13 @@
               <a:t>print</a:t>
             </a:r>
             <a:r>
-              <a:rPr>
+              <a:rPr sz="1800">
                 <a:latin typeface="Courier"/>
               </a:rPr>
               <a:t>(</a:t>
             </a:r>
             <a:r>
-              <a:rPr b="1">
+              <a:rPr sz="1800" b="1">
                 <a:solidFill>
                   <a:srgbClr val="007020"/>
                 </a:solidFill>
@@ -9641,13 +9641,13 @@
               <a:t>mean</a:t>
             </a:r>
             <a:r>
-              <a:rPr>
+              <a:rPr sz="1800">
                 <a:latin typeface="Courier"/>
               </a:rPr>
               <a:t>(cchic</a:t>
             </a:r>
             <a:r>
-              <a:rPr>
+              <a:rPr sz="1800">
                 <a:solidFill>
                   <a:srgbClr val="666666"/>
                 </a:solidFill>
@@ -9656,29 +9656,29 @@
               <a:t>$</a:t>
             </a:r>
             <a:r>
-              <a:rPr>
+              <a:rPr sz="1800">
                 <a:latin typeface="Courier"/>
               </a:rPr>
               <a:t>temp_c))</a:t>
             </a:r>
           </a:p>
           <a:p>
-            <a:pPr lvl="0" indent="0">
+            <a:pPr lvl="0" marL="1270000" indent="0">
               <a:buNone/>
             </a:pPr>
             <a:r>
-              <a:rPr>
+              <a:rPr sz="1800">
                 <a:latin typeface="Courier"/>
               </a:rPr>
               <a:t>## [1] 36.3113</a:t>
             </a:r>
           </a:p>
           <a:p>
-            <a:pPr lvl="0" indent="0">
+            <a:pPr lvl="0" marL="1270000" indent="0">
               <a:buNone/>
             </a:pPr>
             <a:r>
-              <a:rPr b="1">
+              <a:rPr sz="1800" b="1">
                 <a:solidFill>
                   <a:srgbClr val="007020"/>
                 </a:solidFill>
@@ -9687,13 +9687,13 @@
               <a:t>print</a:t>
             </a:r>
             <a:r>
-              <a:rPr>
+              <a:rPr sz="1800">
                 <a:latin typeface="Courier"/>
               </a:rPr>
               <a:t>(</a:t>
             </a:r>
             <a:r>
-              <a:rPr b="1">
+              <a:rPr sz="1800" b="1">
                 <a:solidFill>
                   <a:srgbClr val="007020"/>
                 </a:solidFill>
@@ -9702,13 +9702,13 @@
               <a:t>mean</a:t>
             </a:r>
             <a:r>
-              <a:rPr>
+              <a:rPr sz="1800">
                 <a:latin typeface="Courier"/>
               </a:rPr>
               <a:t>(cchic</a:t>
             </a:r>
             <a:r>
-              <a:rPr>
+              <a:rPr sz="1800">
                 <a:solidFill>
                   <a:srgbClr val="666666"/>
                 </a:solidFill>
@@ -9717,29 +9717,29 @@
               <a:t>$</a:t>
             </a:r>
             <a:r>
-              <a:rPr>
+              <a:rPr sz="1800">
                 <a:latin typeface="Courier"/>
               </a:rPr>
               <a:t>temp_nc))</a:t>
             </a:r>
           </a:p>
           <a:p>
-            <a:pPr lvl="0" indent="0">
+            <a:pPr lvl="0" marL="1270000" indent="0">
               <a:buNone/>
             </a:pPr>
             <a:r>
-              <a:rPr>
+              <a:rPr sz="1800">
                 <a:latin typeface="Courier"/>
               </a:rPr>
               <a:t>## [1] 36.36864</a:t>
             </a:r>
           </a:p>
           <a:p>
-            <a:pPr lvl="0" indent="0">
+            <a:pPr lvl="0" marL="1270000" indent="0">
               <a:buNone/>
             </a:pPr>
             <a:r>
-              <a:rPr i="1">
+              <a:rPr sz="1800" i="1">
                 <a:solidFill>
                   <a:srgbClr val="60A0B0"/>
                 </a:solidFill>
@@ -9840,11 +9840,11 @@
           <a:bodyPr/>
           <a:lstStyle/>
           <a:p>
-            <a:pPr lvl="0" indent="0">
+            <a:pPr lvl="0" marL="1270000" indent="0">
               <a:buNone/>
             </a:pPr>
             <a:r>
-              <a:rPr b="1">
+              <a:rPr sz="1800" b="1">
                 <a:solidFill>
                   <a:srgbClr val="007020"/>
                 </a:solidFill>
@@ -9853,13 +9853,13 @@
               <a:t>for</a:t>
             </a:r>
             <a:r>
-              <a:rPr>
+              <a:rPr sz="1800">
                 <a:latin typeface="Courier"/>
               </a:rPr>
               <a:t>(i </a:t>
             </a:r>
             <a:r>
-              <a:rPr b="1">
+              <a:rPr sz="1800" b="1">
                 <a:solidFill>
                   <a:srgbClr val="007020"/>
                 </a:solidFill>
@@ -9868,13 +9868,13 @@
               <a:t>in</a:t>
             </a:r>
             <a:r>
-              <a:rPr>
-                <a:latin typeface="Courier"/>
-              </a:rPr>
-              <a:t> </a:t>
-            </a:r>
-            <a:r>
-              <a:rPr>
+              <a:rPr sz="1800">
+                <a:latin typeface="Courier"/>
+              </a:rPr>
+              <a:t> </a:t>
+            </a:r>
+            <a:r>
+              <a:rPr sz="1800">
                 <a:solidFill>
                   <a:srgbClr val="40A070"/>
                 </a:solidFill>
@@ -9883,7 +9883,7 @@
               <a:t>1</a:t>
             </a:r>
             <a:r>
-              <a:rPr>
+              <a:rPr sz="1800">
                 <a:solidFill>
                   <a:srgbClr val="666666"/>
                 </a:solidFill>
@@ -9892,7 +9892,7 @@
               <a:t>:</a:t>
             </a:r>
             <a:r>
-              <a:rPr b="1">
+              <a:rPr sz="1800" b="1">
                 <a:solidFill>
                   <a:srgbClr val="007020"/>
                 </a:solidFill>
@@ -9901,27 +9901,27 @@
               <a:t>length</a:t>
             </a:r>
             <a:r>
-              <a:rPr>
+              <a:rPr sz="1800">
                 <a:latin typeface="Courier"/>
               </a:rPr>
               <a:t>(cchic)){</a:t>
             </a:r>
             <a:br/>
             <a:r>
-              <a:rPr>
+              <a:rPr sz="1800">
                 <a:latin typeface="Courier"/>
               </a:rPr>
               <a:t>  </a:t>
             </a:r>
             <a:br/>
             <a:r>
-              <a:rPr>
+              <a:rPr sz="1800">
                 <a:latin typeface="Courier"/>
               </a:rPr>
               <a:t>  </a:t>
             </a:r>
             <a:r>
-              <a:rPr b="1">
+              <a:rPr sz="1800" b="1">
                 <a:solidFill>
                   <a:srgbClr val="007020"/>
                 </a:solidFill>
@@ -9930,13 +9930,13 @@
               <a:t>print</a:t>
             </a:r>
             <a:r>
-              <a:rPr>
+              <a:rPr sz="1800">
                 <a:latin typeface="Courier"/>
               </a:rPr>
               <a:t>(</a:t>
             </a:r>
             <a:r>
-              <a:rPr b="1">
+              <a:rPr sz="1800" b="1">
                 <a:solidFill>
                   <a:srgbClr val="007020"/>
                 </a:solidFill>
@@ -9945,27 +9945,27 @@
               <a:t>names</a:t>
             </a:r>
             <a:r>
-              <a:rPr>
+              <a:rPr sz="1800">
                 <a:latin typeface="Courier"/>
               </a:rPr>
               <a:t>(cchic[i]))</a:t>
             </a:r>
             <a:br/>
             <a:r>
-              <a:rPr>
+              <a:rPr sz="1800">
                 <a:latin typeface="Courier"/>
               </a:rPr>
               <a:t>  </a:t>
             </a:r>
             <a:br/>
             <a:r>
-              <a:rPr>
+              <a:rPr sz="1800">
                 <a:latin typeface="Courier"/>
               </a:rPr>
               <a:t>  </a:t>
             </a:r>
             <a:r>
-              <a:rPr b="1">
+              <a:rPr sz="1800" b="1">
                 <a:solidFill>
                   <a:srgbClr val="007020"/>
                 </a:solidFill>
@@ -9974,13 +9974,13 @@
               <a:t>if</a:t>
             </a:r>
             <a:r>
-              <a:rPr>
+              <a:rPr sz="1800">
                 <a:latin typeface="Courier"/>
               </a:rPr>
               <a:t>(</a:t>
             </a:r>
             <a:r>
-              <a:rPr b="1">
+              <a:rPr sz="1800" b="1">
                 <a:solidFill>
                   <a:srgbClr val="007020"/>
                 </a:solidFill>
@@ -9989,27 +9989,27 @@
               <a:t>is.numeric</a:t>
             </a:r>
             <a:r>
-              <a:rPr>
+              <a:rPr sz="1800">
                 <a:latin typeface="Courier"/>
               </a:rPr>
               <a:t>(cchic[[i]])){</a:t>
             </a:r>
             <a:br/>
             <a:r>
-              <a:rPr>
+              <a:rPr sz="1800">
                 <a:latin typeface="Courier"/>
               </a:rPr>
               <a:t>    </a:t>
             </a:r>
             <a:br/>
             <a:r>
-              <a:rPr>
+              <a:rPr sz="1800">
                 <a:latin typeface="Courier"/>
               </a:rPr>
               <a:t>    </a:t>
             </a:r>
             <a:r>
-              <a:rPr b="1">
+              <a:rPr sz="1800" b="1">
                 <a:solidFill>
                   <a:srgbClr val="007020"/>
                 </a:solidFill>
@@ -10018,13 +10018,13 @@
               <a:t>print</a:t>
             </a:r>
             <a:r>
-              <a:rPr>
+              <a:rPr sz="1800">
                 <a:latin typeface="Courier"/>
               </a:rPr>
               <a:t>(</a:t>
             </a:r>
             <a:r>
-              <a:rPr b="1">
+              <a:rPr sz="1800" b="1">
                 <a:solidFill>
                   <a:srgbClr val="007020"/>
                 </a:solidFill>
@@ -10033,35 +10033,35 @@
               <a:t>mean</a:t>
             </a:r>
             <a:r>
-              <a:rPr>
+              <a:rPr sz="1800">
                 <a:latin typeface="Courier"/>
               </a:rPr>
               <a:t>(cchic[[i]]))</a:t>
             </a:r>
             <a:br/>
             <a:r>
-              <a:rPr>
+              <a:rPr sz="1800">
                 <a:latin typeface="Courier"/>
               </a:rPr>
               <a:t>    </a:t>
             </a:r>
             <a:br/>
             <a:r>
-              <a:rPr>
+              <a:rPr sz="1800">
                 <a:latin typeface="Courier"/>
               </a:rPr>
               <a:t>  }</a:t>
             </a:r>
             <a:br/>
             <a:r>
-              <a:rPr>
+              <a:rPr sz="1800">
                 <a:latin typeface="Courier"/>
               </a:rPr>
               <a:t>  </a:t>
             </a:r>
             <a:br/>
             <a:r>
-              <a:rPr>
+              <a:rPr sz="1800">
                 <a:latin typeface="Courier"/>
               </a:rPr>
               <a:t>}</a:t>
@@ -10381,7 +10381,7 @@
               <a:t>Again, please make sure the </a:t>
             </a:r>
             <a:r>
-              <a:rPr>
+              <a:rPr sz="1800">
                 <a:latin typeface="Courier"/>
               </a:rPr>
               <a:t>cchic</a:t>
@@ -10395,13 +10395,13 @@
             <a:pPr lvl="1"/>
             <a:r>
               <a:rPr/>
-              <a:t>Please download Workshop7.R via </a:t>
+              <a:t>Please download Workshop6.R via </a:t>
             </a:r>
             <a:r>
               <a:rPr>
                 <a:hlinkClick r:id="rId2"/>
               </a:rPr>
-              <a:t>https://github.com/ClinicianCoders/ClinicianCoders/Workshops/Workshop7.R</a:t>
+              <a:t>https://github.com/ClinicianCoders/ClinicianCoders/blob/master/Workshops/Workshop6.R</a:t>
             </a:r>
           </a:p>
           <a:p>
@@ -10411,7 +10411,7 @@
               <a:t>Question: How do we calculate the mean of every numeric variable in </a:t>
             </a:r>
             <a:r>
-              <a:rPr>
+              <a:rPr sz="1800">
                 <a:latin typeface="Courier"/>
               </a:rPr>
               <a:t>chicc</a:t>
@@ -10631,7 +10631,7 @@
               <a:t>Control flow is an </a:t>
             </a:r>
             <a:r>
-              <a:rPr>
+              <a:rPr sz="1800">
                 <a:latin typeface="Courier"/>
               </a:rPr>
               <a:t>if</a:t>
@@ -10648,7 +10648,7 @@
               <a:t>There are 3 parts to an </a:t>
             </a:r>
             <a:r>
-              <a:rPr>
+              <a:rPr sz="1800">
                 <a:latin typeface="Courier"/>
               </a:rPr>
               <a:t>if</a:t>
@@ -10769,17 +10769,17 @@
           <a:bodyPr/>
           <a:lstStyle/>
           <a:p>
-            <a:pPr lvl="0" indent="0">
+            <a:pPr lvl="0" marL="1270000" indent="0">
               <a:buNone/>
             </a:pPr>
             <a:r>
-              <a:rPr>
+              <a:rPr sz="1800">
                 <a:latin typeface="Courier"/>
               </a:rPr>
               <a:t>raining &lt;-</a:t>
             </a:r>
             <a:r>
-              <a:rPr>
+              <a:rPr sz="1800">
                 <a:solidFill>
                   <a:srgbClr val="4070A0"/>
                 </a:solidFill>
@@ -10788,7 +10788,7 @@
               <a:t> </a:t>
             </a:r>
             <a:r>
-              <a:rPr>
+              <a:rPr sz="1800">
                 <a:solidFill>
                   <a:srgbClr val="007020"/>
                 </a:solidFill>
@@ -10799,7 +10799,7 @@
             <a:br/>
             <a:br/>
             <a:r>
-              <a:rPr b="1">
+              <a:rPr sz="1800" b="1">
                 <a:solidFill>
                   <a:srgbClr val="007020"/>
                 </a:solidFill>
@@ -10808,13 +10808,13 @@
               <a:t>if</a:t>
             </a:r>
             <a:r>
-              <a:rPr>
+              <a:rPr sz="1800">
                 <a:latin typeface="Courier"/>
               </a:rPr>
               <a:t>(raining </a:t>
             </a:r>
             <a:r>
-              <a:rPr>
+              <a:rPr sz="1800">
                 <a:solidFill>
                   <a:srgbClr val="666666"/>
                 </a:solidFill>
@@ -10823,7 +10823,7 @@
               <a:t>==</a:t>
             </a:r>
             <a:r>
-              <a:rPr>
+              <a:rPr sz="1800">
                 <a:solidFill>
                   <a:srgbClr val="4070A0"/>
                 </a:solidFill>
@@ -10832,7 +10832,7 @@
               <a:t> </a:t>
             </a:r>
             <a:r>
-              <a:rPr>
+              <a:rPr sz="1800">
                 <a:solidFill>
                   <a:srgbClr val="007020"/>
                 </a:solidFill>
@@ -10841,27 +10841,27 @@
               <a:t>TRUE</a:t>
             </a:r>
             <a:r>
-              <a:rPr>
+              <a:rPr sz="1800">
                 <a:latin typeface="Courier"/>
               </a:rPr>
               <a:t>){</a:t>
             </a:r>
             <a:br/>
             <a:r>
-              <a:rPr>
+              <a:rPr sz="1800">
                 <a:latin typeface="Courier"/>
               </a:rPr>
               <a:t>  </a:t>
             </a:r>
             <a:br/>
             <a:r>
-              <a:rPr>
+              <a:rPr sz="1800">
                 <a:latin typeface="Courier"/>
               </a:rPr>
               <a:t>  </a:t>
             </a:r>
             <a:r>
-              <a:rPr b="1">
+              <a:rPr sz="1800" b="1">
                 <a:solidFill>
                   <a:srgbClr val="007020"/>
                 </a:solidFill>
@@ -10870,13 +10870,13 @@
               <a:t>print</a:t>
             </a:r>
             <a:r>
-              <a:rPr>
+              <a:rPr sz="1800">
                 <a:latin typeface="Courier"/>
               </a:rPr>
               <a:t>(</a:t>
             </a:r>
             <a:r>
-              <a:rPr>
+              <a:rPr sz="1800">
                 <a:solidFill>
                   <a:srgbClr val="4070A0"/>
                 </a:solidFill>
@@ -10885,32 +10885,32 @@
               <a:t>"Bring an umbrella!"</a:t>
             </a:r>
             <a:r>
-              <a:rPr>
+              <a:rPr sz="1800">
                 <a:latin typeface="Courier"/>
               </a:rPr>
               <a:t>)</a:t>
             </a:r>
             <a:br/>
             <a:r>
-              <a:rPr>
+              <a:rPr sz="1800">
                 <a:latin typeface="Courier"/>
               </a:rPr>
               <a:t>  </a:t>
             </a:r>
             <a:br/>
             <a:r>
-              <a:rPr>
+              <a:rPr sz="1800">
                 <a:latin typeface="Courier"/>
               </a:rPr>
               <a:t>}</a:t>
             </a:r>
           </a:p>
           <a:p>
-            <a:pPr lvl="0" indent="0">
+            <a:pPr lvl="0" marL="1270000" indent="0">
               <a:buNone/>
             </a:pPr>
             <a:r>
-              <a:rPr>
+              <a:rPr sz="1800">
                 <a:latin typeface="Courier"/>
               </a:rPr>
               <a:t>## [1] "Bring an umbrella!"</a:t>
@@ -11025,7 +11025,7 @@
           <a:p>
             <a:pPr lvl="2"/>
             <a:r>
-              <a:rPr>
+              <a:rPr sz="1800">
                 <a:latin typeface="Courier"/>
               </a:rPr>
               <a:t>x == y</a:t>
@@ -11038,7 +11038,7 @@
           <a:p>
             <a:pPr lvl="2"/>
             <a:r>
-              <a:rPr>
+              <a:rPr sz="1800">
                 <a:latin typeface="Courier"/>
               </a:rPr>
               <a:t>x != y</a:t>
@@ -11051,7 +11051,7 @@
           <a:p>
             <a:pPr lvl="2"/>
             <a:r>
-              <a:rPr>
+              <a:rPr sz="1800">
                 <a:latin typeface="Courier"/>
               </a:rPr>
               <a:t>x &lt; y</a:t>
@@ -11064,7 +11064,7 @@
           <a:p>
             <a:pPr lvl="2"/>
             <a:r>
-              <a:rPr>
+              <a:rPr sz="1800">
                 <a:latin typeface="Courier"/>
               </a:rPr>
               <a:t>x &lt;= y</a:t>
@@ -11077,7 +11077,7 @@
           <a:p>
             <a:pPr lvl="2"/>
             <a:r>
-              <a:rPr>
+              <a:rPr sz="1800">
                 <a:latin typeface="Courier"/>
               </a:rPr>
               <a:t>x &gt; y</a:t>
@@ -11090,7 +11090,7 @@
           <a:p>
             <a:pPr lvl="2"/>
             <a:r>
-              <a:rPr>
+              <a:rPr sz="1800">
                 <a:latin typeface="Courier"/>
               </a:rPr>
               <a:t>x &gt;= y</a:t>

</xml_diff>

<commit_message>
Correct typos in workshop 6
</commit_message>
<xml_diff>
--- a/Workshops/Workshop6.pptx
+++ b/Workshops/Workshop6.pptx
@@ -1,6 +1,6 @@
 
 <file path=ppt/presentation.xml><?xml version="1.0" encoding="utf-8"?>
-<p:presentation xmlns:a="http://schemas.openxmlformats.org/drawingml/2006/main" xmlns:r="http://schemas.openxmlformats.org/officeDocument/2006/relationships" xmlns:p="http://schemas.openxmlformats.org/presentationml/2006/main" saveSubsetFonts="1" autoCompressPictures="0">
+<p:presentation xmlns:a="http://schemas.openxmlformats.org/drawingml/2006/main" xmlns:p="http://schemas.openxmlformats.org/presentationml/2006/main" xmlns:r="http://schemas.openxmlformats.org/officeDocument/2006/relationships" autoCompressPictures="0" saveSubsetFonts="1">
   <p:sldMasterIdLst>
     <p:sldMasterId id="2147483648" r:id="rId1"/>
   </p:sldMasterIdLst>
@@ -48,8 +48,8 @@
     <a:defPPr>
       <a:defRPr lang="en-US"/>
     </a:defPPr>
-    <a:lvl1pPr marL="0" algn="l" defTabSz="914400" rtl="0" eaLnBrk="1" latinLnBrk="0" hangingPunct="1">
-      <a:defRPr sz="1800" kern="1200">
+    <a:lvl1pPr algn="l" defTabSz="914400" eaLnBrk="1" hangingPunct="1" latinLnBrk="0" marL="0" rtl="0">
+      <a:defRPr kern="1200" sz="1800">
         <a:solidFill>
           <a:schemeClr val="tx1"/>
         </a:solidFill>
@@ -58,8 +58,8 @@
         <a:cs typeface="+mn-cs"/>
       </a:defRPr>
     </a:lvl1pPr>
-    <a:lvl2pPr marL="457200" algn="l" defTabSz="914400" rtl="0" eaLnBrk="1" latinLnBrk="0" hangingPunct="1">
-      <a:defRPr sz="1800" kern="1200">
+    <a:lvl2pPr algn="l" defTabSz="914400" eaLnBrk="1" hangingPunct="1" latinLnBrk="0" marL="457200" rtl="0">
+      <a:defRPr kern="1200" sz="1800">
         <a:solidFill>
           <a:schemeClr val="tx1"/>
         </a:solidFill>
@@ -68,8 +68,8 @@
         <a:cs typeface="+mn-cs"/>
       </a:defRPr>
     </a:lvl2pPr>
-    <a:lvl3pPr marL="914400" algn="l" defTabSz="914400" rtl="0" eaLnBrk="1" latinLnBrk="0" hangingPunct="1">
-      <a:defRPr sz="1800" kern="1200">
+    <a:lvl3pPr algn="l" defTabSz="914400" eaLnBrk="1" hangingPunct="1" latinLnBrk="0" marL="914400" rtl="0">
+      <a:defRPr kern="1200" sz="1800">
         <a:solidFill>
           <a:schemeClr val="tx1"/>
         </a:solidFill>
@@ -78,8 +78,8 @@
         <a:cs typeface="+mn-cs"/>
       </a:defRPr>
     </a:lvl3pPr>
-    <a:lvl4pPr marL="1371600" algn="l" defTabSz="914400" rtl="0" eaLnBrk="1" latinLnBrk="0" hangingPunct="1">
-      <a:defRPr sz="1800" kern="1200">
+    <a:lvl4pPr algn="l" defTabSz="914400" eaLnBrk="1" hangingPunct="1" latinLnBrk="0" marL="1371600" rtl="0">
+      <a:defRPr kern="1200" sz="1800">
         <a:solidFill>
           <a:schemeClr val="tx1"/>
         </a:solidFill>
@@ -88,8 +88,8 @@
         <a:cs typeface="+mn-cs"/>
       </a:defRPr>
     </a:lvl4pPr>
-    <a:lvl5pPr marL="1828800" algn="l" defTabSz="914400" rtl="0" eaLnBrk="1" latinLnBrk="0" hangingPunct="1">
-      <a:defRPr sz="1800" kern="1200">
+    <a:lvl5pPr algn="l" defTabSz="914400" eaLnBrk="1" hangingPunct="1" latinLnBrk="0" marL="1828800" rtl="0">
+      <a:defRPr kern="1200" sz="1800">
         <a:solidFill>
           <a:schemeClr val="tx1"/>
         </a:solidFill>
@@ -98,8 +98,8 @@
         <a:cs typeface="+mn-cs"/>
       </a:defRPr>
     </a:lvl5pPr>
-    <a:lvl6pPr marL="2286000" algn="l" defTabSz="914400" rtl="0" eaLnBrk="1" latinLnBrk="0" hangingPunct="1">
-      <a:defRPr sz="1800" kern="1200">
+    <a:lvl6pPr algn="l" defTabSz="914400" eaLnBrk="1" hangingPunct="1" latinLnBrk="0" marL="2286000" rtl="0">
+      <a:defRPr kern="1200" sz="1800">
         <a:solidFill>
           <a:schemeClr val="tx1"/>
         </a:solidFill>
@@ -108,8 +108,8 @@
         <a:cs typeface="+mn-cs"/>
       </a:defRPr>
     </a:lvl6pPr>
-    <a:lvl7pPr marL="2743200" algn="l" defTabSz="914400" rtl="0" eaLnBrk="1" latinLnBrk="0" hangingPunct="1">
-      <a:defRPr sz="1800" kern="1200">
+    <a:lvl7pPr algn="l" defTabSz="914400" eaLnBrk="1" hangingPunct="1" latinLnBrk="0" marL="2743200" rtl="0">
+      <a:defRPr kern="1200" sz="1800">
         <a:solidFill>
           <a:schemeClr val="tx1"/>
         </a:solidFill>
@@ -118,8 +118,8 @@
         <a:cs typeface="+mn-cs"/>
       </a:defRPr>
     </a:lvl7pPr>
-    <a:lvl8pPr marL="3200400" algn="l" defTabSz="914400" rtl="0" eaLnBrk="1" latinLnBrk="0" hangingPunct="1">
-      <a:defRPr sz="1800" kern="1200">
+    <a:lvl8pPr algn="l" defTabSz="914400" eaLnBrk="1" hangingPunct="1" latinLnBrk="0" marL="3200400" rtl="0">
+      <a:defRPr kern="1200" sz="1800">
         <a:solidFill>
           <a:schemeClr val="tx1"/>
         </a:solidFill>
@@ -128,8 +128,8 @@
         <a:cs typeface="+mn-cs"/>
       </a:defRPr>
     </a:lvl8pPr>
-    <a:lvl9pPr marL="3657600" algn="l" defTabSz="914400" rtl="0" eaLnBrk="1" latinLnBrk="0" hangingPunct="1">
-      <a:defRPr sz="1800" kern="1200">
+    <a:lvl9pPr algn="l" defTabSz="914400" eaLnBrk="1" hangingPunct="1" latinLnBrk="0" marL="3657600" rtl="0">
+      <a:defRPr kern="1200" sz="1800">
         <a:solidFill>
           <a:schemeClr val="tx1"/>
         </a:solidFill>
@@ -4340,7 +4340,7 @@
             <a:spLocks noGrp="1"/>
           </p:cNvSpPr>
           <p:nvPr>
-            <p:ph type="subTitle" idx="1"/>
+            <p:ph idx="1" type="subTitle"/>
           </p:nvPr>
         </p:nvSpPr>
         <p:spPr>
@@ -5131,7 +5131,7 @@
             </a:r>
             <a:r>
               <a:rPr/>
-              <a:t> to print our your result. Remember to remove NA’s if needed.</a:t>
+              <a:t> to print out your result. Remember to remove NA’s if needed.</a:t>
             </a:r>
           </a:p>
         </p:txBody>
@@ -8102,7 +8102,7 @@
             </a:r>
             <a:r>
               <a:rPr/>
-              <a:t> will print out the contents of column 1.</a:t>
+              <a:t> will print out the name of column 1.</a:t>
             </a:r>
           </a:p>
         </p:txBody>

</xml_diff>